<commit_message>
Presentation ready for input
</commit_message>
<xml_diff>
--- a/Powerpoint/Presentation.pptx
+++ b/Powerpoint/Presentation.pptx
@@ -5,7 +5,7 @@
     <p:sldMasterId id="2147483660" r:id="rId1"/>
   </p:sldMasterIdLst>
   <p:notesMasterIdLst>
-    <p:notesMasterId r:id="rId8"/>
+    <p:notesMasterId r:id="rId11"/>
   </p:notesMasterIdLst>
   <p:sldIdLst>
     <p:sldId id="256" r:id="rId2"/>
@@ -14,6 +14,9 @@
     <p:sldId id="259" r:id="rId5"/>
     <p:sldId id="260" r:id="rId6"/>
     <p:sldId id="261" r:id="rId7"/>
+    <p:sldId id="262" r:id="rId8"/>
+    <p:sldId id="263" r:id="rId9"/>
+    <p:sldId id="264" r:id="rId10"/>
   </p:sldIdLst>
   <p:sldSz cx="12192000" cy="6858000"/>
   <p:notesSz cx="6858000" cy="9144000"/>
@@ -547,6 +550,90 @@
     <p:extLst>
       <p:ext uri="{BB962C8B-B14F-4D97-AF65-F5344CB8AC3E}">
         <p14:creationId xmlns:p14="http://schemas.microsoft.com/office/powerpoint/2010/main" val="2322884839"/>
+      </p:ext>
+    </p:extLst>
+  </p:cSld>
+  <p:clrMapOvr>
+    <a:masterClrMapping/>
+  </p:clrMapOvr>
+</p:notes>
+</file>
+
+<file path=ppt/notesSlides/notesSlide2.xml><?xml version="1.0" encoding="utf-8"?>
+<p:notes xmlns:a="http://schemas.openxmlformats.org/drawingml/2006/main" xmlns:r="http://schemas.openxmlformats.org/officeDocument/2006/relationships" xmlns:p="http://schemas.openxmlformats.org/presentationml/2006/main">
+  <p:cSld>
+    <p:spTree>
+      <p:nvGrpSpPr>
+        <p:cNvPr id="1" name=""/>
+        <p:cNvGrpSpPr/>
+        <p:nvPr/>
+      </p:nvGrpSpPr>
+      <p:grpSpPr>
+        <a:xfrm>
+          <a:off x="0" y="0"/>
+          <a:ext cx="0" cy="0"/>
+          <a:chOff x="0" y="0"/>
+          <a:chExt cx="0" cy="0"/>
+        </a:xfrm>
+      </p:grpSpPr>
+      <p:sp>
+        <p:nvSpPr>
+          <p:cNvPr id="2" name="Slide Image Placeholder 1"/>
+          <p:cNvSpPr>
+            <a:spLocks noGrp="1" noRot="1" noChangeAspect="1"/>
+          </p:cNvSpPr>
+          <p:nvPr>
+            <p:ph type="sldImg"/>
+          </p:nvPr>
+        </p:nvSpPr>
+        <p:spPr/>
+      </p:sp>
+      <p:sp>
+        <p:nvSpPr>
+          <p:cNvPr id="3" name="Notes Placeholder 2"/>
+          <p:cNvSpPr>
+            <a:spLocks noGrp="1"/>
+          </p:cNvSpPr>
+          <p:nvPr>
+            <p:ph type="body" idx="1"/>
+          </p:nvPr>
+        </p:nvSpPr>
+        <p:spPr/>
+        <p:txBody>
+          <a:bodyPr/>
+          <a:lstStyle/>
+          <a:p>
+            <a:endParaRPr lang="en-US" dirty="0"/>
+          </a:p>
+        </p:txBody>
+      </p:sp>
+      <p:sp>
+        <p:nvSpPr>
+          <p:cNvPr id="4" name="Slide Number Placeholder 3"/>
+          <p:cNvSpPr>
+            <a:spLocks noGrp="1"/>
+          </p:cNvSpPr>
+          <p:nvPr>
+            <p:ph type="sldNum" sz="quarter" idx="5"/>
+          </p:nvPr>
+        </p:nvSpPr>
+        <p:spPr/>
+        <p:txBody>
+          <a:bodyPr/>
+          <a:lstStyle/>
+          <a:p>
+            <a:fld id="{003A55BB-3198-42C5-8E0C-DB7DB2B7DC8C}" type="slidenum">
+              <a:rPr lang="en-US" smtClean="0"/>
+              <a:t>6</a:t>
+            </a:fld>
+            <a:endParaRPr lang="en-US"/>
+          </a:p>
+        </p:txBody>
+      </p:sp>
+    </p:spTree>
+    <p:extLst>
+      <p:ext uri="{BB962C8B-B14F-4D97-AF65-F5344CB8AC3E}">
+        <p14:creationId xmlns:p14="http://schemas.microsoft.com/office/powerpoint/2010/main" val="4266312317"/>
       </p:ext>
     </p:extLst>
   </p:cSld>
@@ -7224,7 +7311,7 @@
         <p:spPr>
           <a:xfrm>
             <a:off x="833933" y="731520"/>
-            <a:ext cx="7702905" cy="3970318"/>
+            <a:ext cx="7702905" cy="4585871"/>
           </a:xfrm>
           <a:prstGeom prst="rect">
             <a:avLst/>
@@ -7284,7 +7371,7 @@
             </a:pPr>
             <a:r>
               <a:rPr lang="en-US" sz="2000" dirty="0"/>
-              <a:t>Does MPAA rating effect the box office?</a:t>
+              <a:t>Does when the movie is released affect the box office</a:t>
             </a:r>
             <a:br>
               <a:rPr lang="en-US" sz="2000" dirty="0"/>
@@ -7298,7 +7385,21 @@
             </a:pPr>
             <a:r>
               <a:rPr lang="en-US" sz="2000" dirty="0"/>
-              <a:t>Does runtime effect box office results?</a:t>
+              <a:t>Does MPAA rating affect the box office?</a:t>
+            </a:r>
+            <a:br>
+              <a:rPr lang="en-US" sz="2000" dirty="0"/>
+            </a:br>
+            <a:endParaRPr lang="en-US" sz="2000" dirty="0"/>
+          </a:p>
+          <a:p>
+            <a:pPr marL="800100" lvl="1" indent="-342900">
+              <a:buFont typeface="Arial" panose="020B0604020202020204" pitchFamily="34" charset="0"/>
+              <a:buChar char="•"/>
+            </a:pPr>
+            <a:r>
+              <a:rPr lang="en-US" sz="2000" dirty="0"/>
+              <a:t>Does runtime affect box office results?</a:t>
             </a:r>
           </a:p>
         </p:txBody>
@@ -7497,6 +7598,55 @@
                                           <p:spTgt spid="4">
                                             <p:txEl>
                                               <p:pRg st="4" end="4"/>
+                                            </p:txEl>
+                                          </p:spTgt>
+                                        </p:tgtEl>
+                                        <p:attrNameLst>
+                                          <p:attrName>style.visibility</p:attrName>
+                                        </p:attrNameLst>
+                                      </p:cBhvr>
+                                      <p:to>
+                                        <p:strVal val="visible"/>
+                                      </p:to>
+                                    </p:set>
+                                  </p:childTnLst>
+                                </p:cTn>
+                              </p:par>
+                            </p:childTnLst>
+                          </p:cTn>
+                        </p:par>
+                      </p:childTnLst>
+                    </p:cTn>
+                  </p:par>
+                  <p:par>
+                    <p:cTn id="19" fill="hold">
+                      <p:stCondLst>
+                        <p:cond delay="indefinite"/>
+                      </p:stCondLst>
+                      <p:childTnLst>
+                        <p:par>
+                          <p:cTn id="20" fill="hold">
+                            <p:stCondLst>
+                              <p:cond delay="0"/>
+                            </p:stCondLst>
+                            <p:childTnLst>
+                              <p:par>
+                                <p:cTn id="21" presetID="1" presetClass="entr" presetSubtype="0" fill="hold" nodeType="clickEffect">
+                                  <p:stCondLst>
+                                    <p:cond delay="0"/>
+                                  </p:stCondLst>
+                                  <p:childTnLst>
+                                    <p:set>
+                                      <p:cBhvr>
+                                        <p:cTn id="22" dur="1" fill="hold">
+                                          <p:stCondLst>
+                                            <p:cond delay="0"/>
+                                          </p:stCondLst>
+                                        </p:cTn>
+                                        <p:tgtEl>
+                                          <p:spTgt spid="4">
+                                            <p:txEl>
+                                              <p:pRg st="5" end="5"/>
                                             </p:txEl>
                                           </p:spTgt>
                                         </p:tgtEl>
@@ -8273,7 +8423,7 @@
         <p:spPr>
           <a:xfrm>
             <a:off x="768868" y="1865377"/>
-            <a:ext cx="10643616" cy="2308324"/>
+            <a:ext cx="10643616" cy="3539430"/>
           </a:xfrm>
           <a:prstGeom prst="rect">
             <a:avLst/>
@@ -8448,6 +8598,108 @@
               <a:buFont typeface="Arial" panose="020B0604020202020204" pitchFamily="34" charset="0"/>
               <a:buChar char="•"/>
             </a:pPr>
+            <a:r>
+              <a:rPr lang="en-US" sz="2000" dirty="0" err="1">
+                <a:ln>
+                  <a:solidFill>
+                    <a:schemeClr val="bg1">
+                      <a:lumMod val="75000"/>
+                      <a:lumOff val="25000"/>
+                      <a:alpha val="10000"/>
+                    </a:schemeClr>
+                  </a:solidFill>
+                </a:ln>
+                <a:solidFill>
+                  <a:schemeClr val="tx2"/>
+                </a:solidFill>
+                <a:effectLst>
+                  <a:outerShdw blurRad="9525" dist="25400" dir="14640000" algn="tl" rotWithShape="0">
+                    <a:schemeClr val="bg1">
+                      <a:alpha val="30000"/>
+                    </a:schemeClr>
+                  </a:outerShdw>
+                </a:effectLst>
+                <a:latin typeface="+mj-lt"/>
+                <a:ea typeface="+mj-ea"/>
+              </a:rPr>
+              <a:t>NaN</a:t>
+            </a:r>
+            <a:r>
+              <a:rPr lang="en-US" sz="2000" dirty="0">
+                <a:ln>
+                  <a:solidFill>
+                    <a:schemeClr val="bg1">
+                      <a:lumMod val="75000"/>
+                      <a:lumOff val="25000"/>
+                      <a:alpha val="10000"/>
+                    </a:schemeClr>
+                  </a:solidFill>
+                </a:ln>
+                <a:solidFill>
+                  <a:schemeClr val="tx2"/>
+                </a:solidFill>
+                <a:effectLst>
+                  <a:outerShdw blurRad="9525" dist="25400" dir="14640000" algn="tl" rotWithShape="0">
+                    <a:schemeClr val="bg1">
+                      <a:alpha val="30000"/>
+                    </a:schemeClr>
+                  </a:outerShdw>
+                </a:effectLst>
+                <a:latin typeface="+mj-lt"/>
+                <a:ea typeface="+mj-ea"/>
+              </a:rPr>
+              <a:t> vs “N/A”</a:t>
+            </a:r>
+            <a:br>
+              <a:rPr lang="en-US" sz="2000" dirty="0">
+                <a:ln>
+                  <a:solidFill>
+                    <a:schemeClr val="bg1">
+                      <a:lumMod val="75000"/>
+                      <a:lumOff val="25000"/>
+                      <a:alpha val="10000"/>
+                    </a:schemeClr>
+                  </a:solidFill>
+                </a:ln>
+                <a:solidFill>
+                  <a:schemeClr val="tx2"/>
+                </a:solidFill>
+                <a:effectLst>
+                  <a:outerShdw blurRad="9525" dist="25400" dir="14640000" algn="tl" rotWithShape="0">
+                    <a:schemeClr val="bg1">
+                      <a:alpha val="30000"/>
+                    </a:schemeClr>
+                  </a:outerShdw>
+                </a:effectLst>
+                <a:latin typeface="+mj-lt"/>
+                <a:ea typeface="+mj-ea"/>
+              </a:rPr>
+            </a:br>
+            <a:br>
+              <a:rPr lang="en-US" sz="2000" dirty="0">
+                <a:ln>
+                  <a:solidFill>
+                    <a:schemeClr val="bg1">
+                      <a:lumMod val="75000"/>
+                      <a:lumOff val="25000"/>
+                      <a:alpha val="10000"/>
+                    </a:schemeClr>
+                  </a:solidFill>
+                </a:ln>
+                <a:solidFill>
+                  <a:schemeClr val="tx2"/>
+                </a:solidFill>
+                <a:effectLst>
+                  <a:outerShdw blurRad="9525" dist="25400" dir="14640000" algn="tl" rotWithShape="0">
+                    <a:schemeClr val="bg1">
+                      <a:alpha val="30000"/>
+                    </a:schemeClr>
+                  </a:outerShdw>
+                </a:effectLst>
+                <a:latin typeface="+mj-lt"/>
+                <a:ea typeface="+mj-ea"/>
+              </a:rPr>
+            </a:br>
             <a:endParaRPr lang="en-US" sz="2000" dirty="0">
               <a:ln>
                 <a:solidFill>
@@ -8472,12 +8724,584 @@
               <a:ea typeface="+mj-ea"/>
             </a:endParaRPr>
           </a:p>
+          <a:p>
+            <a:pPr marL="342900" indent="-342900">
+              <a:buFont typeface="Arial" panose="020B0604020202020204" pitchFamily="34" charset="0"/>
+              <a:buChar char="•"/>
+            </a:pPr>
+            <a:r>
+              <a:rPr lang="en-US" sz="2000" dirty="0">
+                <a:ln>
+                  <a:solidFill>
+                    <a:schemeClr val="bg1">
+                      <a:lumMod val="75000"/>
+                      <a:lumOff val="25000"/>
+                      <a:alpha val="10000"/>
+                    </a:schemeClr>
+                  </a:solidFill>
+                </a:ln>
+                <a:solidFill>
+                  <a:schemeClr val="tx2"/>
+                </a:solidFill>
+                <a:effectLst>
+                  <a:outerShdw blurRad="9525" dist="25400" dir="14640000" algn="tl" rotWithShape="0">
+                    <a:schemeClr val="bg1">
+                      <a:alpha val="30000"/>
+                    </a:schemeClr>
+                  </a:outerShdw>
+                </a:effectLst>
+                <a:latin typeface="+mj-lt"/>
+                <a:ea typeface="+mj-ea"/>
+              </a:rPr>
+              <a:t>Currency format string</a:t>
+            </a:r>
+          </a:p>
+          <a:p>
+            <a:pPr marL="342900" indent="-342900">
+              <a:buFont typeface="Arial" panose="020B0604020202020204" pitchFamily="34" charset="0"/>
+              <a:buChar char="•"/>
+            </a:pPr>
+            <a:endParaRPr lang="en-US" sz="2000" dirty="0">
+              <a:ln>
+                <a:solidFill>
+                  <a:schemeClr val="bg1">
+                    <a:lumMod val="75000"/>
+                    <a:lumOff val="25000"/>
+                    <a:alpha val="10000"/>
+                  </a:schemeClr>
+                </a:solidFill>
+              </a:ln>
+              <a:solidFill>
+                <a:schemeClr val="tx2"/>
+              </a:solidFill>
+              <a:effectLst>
+                <a:outerShdw blurRad="9525" dist="25400" dir="14640000" algn="tl" rotWithShape="0">
+                  <a:schemeClr val="bg1">
+                    <a:alpha val="30000"/>
+                  </a:schemeClr>
+                </a:outerShdw>
+              </a:effectLst>
+              <a:latin typeface="+mj-lt"/>
+              <a:ea typeface="+mj-ea"/>
+            </a:endParaRPr>
+          </a:p>
         </p:txBody>
       </p:sp>
     </p:spTree>
     <p:extLst>
       <p:ext uri="{BB962C8B-B14F-4D97-AF65-F5344CB8AC3E}">
         <p14:creationId xmlns:p14="http://schemas.microsoft.com/office/powerpoint/2010/main" val="2649451416"/>
+      </p:ext>
+    </p:extLst>
+  </p:cSld>
+  <p:clrMapOvr>
+    <a:masterClrMapping/>
+  </p:clrMapOvr>
+  <p:timing>
+    <p:tnLst>
+      <p:par>
+        <p:cTn id="1" dur="indefinite" restart="never" nodeType="tmRoot">
+          <p:childTnLst>
+            <p:seq concurrent="1" nextAc="seek">
+              <p:cTn id="2" dur="indefinite" nodeType="mainSeq">
+                <p:childTnLst>
+                  <p:par>
+                    <p:cTn id="3" fill="hold">
+                      <p:stCondLst>
+                        <p:cond delay="indefinite"/>
+                      </p:stCondLst>
+                      <p:childTnLst>
+                        <p:par>
+                          <p:cTn id="4" fill="hold">
+                            <p:stCondLst>
+                              <p:cond delay="0"/>
+                            </p:stCondLst>
+                            <p:childTnLst>
+                              <p:par>
+                                <p:cTn id="5" presetID="1" presetClass="entr" presetSubtype="0" fill="hold" nodeType="clickEffect">
+                                  <p:stCondLst>
+                                    <p:cond delay="0"/>
+                                  </p:stCondLst>
+                                  <p:childTnLst>
+                                    <p:set>
+                                      <p:cBhvr>
+                                        <p:cTn id="6" dur="1" fill="hold">
+                                          <p:stCondLst>
+                                            <p:cond delay="0"/>
+                                          </p:stCondLst>
+                                        </p:cTn>
+                                        <p:tgtEl>
+                                          <p:spTgt spid="5">
+                                            <p:txEl>
+                                              <p:pRg st="2" end="2"/>
+                                            </p:txEl>
+                                          </p:spTgt>
+                                        </p:tgtEl>
+                                        <p:attrNameLst>
+                                          <p:attrName>style.visibility</p:attrName>
+                                        </p:attrNameLst>
+                                      </p:cBhvr>
+                                      <p:to>
+                                        <p:strVal val="visible"/>
+                                      </p:to>
+                                    </p:set>
+                                  </p:childTnLst>
+                                </p:cTn>
+                              </p:par>
+                            </p:childTnLst>
+                          </p:cTn>
+                        </p:par>
+                      </p:childTnLst>
+                    </p:cTn>
+                  </p:par>
+                  <p:par>
+                    <p:cTn id="7" fill="hold">
+                      <p:stCondLst>
+                        <p:cond delay="indefinite"/>
+                      </p:stCondLst>
+                      <p:childTnLst>
+                        <p:par>
+                          <p:cTn id="8" fill="hold">
+                            <p:stCondLst>
+                              <p:cond delay="0"/>
+                            </p:stCondLst>
+                            <p:childTnLst>
+                              <p:par>
+                                <p:cTn id="9" presetID="1" presetClass="entr" presetSubtype="0" fill="hold" nodeType="clickEffect">
+                                  <p:stCondLst>
+                                    <p:cond delay="0"/>
+                                  </p:stCondLst>
+                                  <p:childTnLst>
+                                    <p:set>
+                                      <p:cBhvr>
+                                        <p:cTn id="10" dur="1" fill="hold">
+                                          <p:stCondLst>
+                                            <p:cond delay="0"/>
+                                          </p:stCondLst>
+                                        </p:cTn>
+                                        <p:tgtEl>
+                                          <p:spTgt spid="5">
+                                            <p:txEl>
+                                              <p:pRg st="3" end="3"/>
+                                            </p:txEl>
+                                          </p:spTgt>
+                                        </p:tgtEl>
+                                        <p:attrNameLst>
+                                          <p:attrName>style.visibility</p:attrName>
+                                        </p:attrNameLst>
+                                      </p:cBhvr>
+                                      <p:to>
+                                        <p:strVal val="visible"/>
+                                      </p:to>
+                                    </p:set>
+                                  </p:childTnLst>
+                                </p:cTn>
+                              </p:par>
+                            </p:childTnLst>
+                          </p:cTn>
+                        </p:par>
+                      </p:childTnLst>
+                    </p:cTn>
+                  </p:par>
+                  <p:par>
+                    <p:cTn id="11" fill="hold">
+                      <p:stCondLst>
+                        <p:cond delay="indefinite"/>
+                      </p:stCondLst>
+                      <p:childTnLst>
+                        <p:par>
+                          <p:cTn id="12" fill="hold">
+                            <p:stCondLst>
+                              <p:cond delay="0"/>
+                            </p:stCondLst>
+                            <p:childTnLst>
+                              <p:par>
+                                <p:cTn id="13" presetID="1" presetClass="entr" presetSubtype="0" fill="hold" nodeType="clickEffect">
+                                  <p:stCondLst>
+                                    <p:cond delay="0"/>
+                                  </p:stCondLst>
+                                  <p:childTnLst>
+                                    <p:set>
+                                      <p:cBhvr>
+                                        <p:cTn id="14" dur="1" fill="hold">
+                                          <p:stCondLst>
+                                            <p:cond delay="0"/>
+                                          </p:stCondLst>
+                                        </p:cTn>
+                                        <p:tgtEl>
+                                          <p:spTgt spid="5">
+                                            <p:txEl>
+                                              <p:pRg st="4" end="4"/>
+                                            </p:txEl>
+                                          </p:spTgt>
+                                        </p:tgtEl>
+                                        <p:attrNameLst>
+                                          <p:attrName>style.visibility</p:attrName>
+                                        </p:attrNameLst>
+                                      </p:cBhvr>
+                                      <p:to>
+                                        <p:strVal val="visible"/>
+                                      </p:to>
+                                    </p:set>
+                                  </p:childTnLst>
+                                </p:cTn>
+                              </p:par>
+                            </p:childTnLst>
+                          </p:cTn>
+                        </p:par>
+                      </p:childTnLst>
+                    </p:cTn>
+                  </p:par>
+                </p:childTnLst>
+              </p:cTn>
+              <p:prevCondLst>
+                <p:cond evt="onPrev" delay="0">
+                  <p:tgtEl>
+                    <p:sldTgt/>
+                  </p:tgtEl>
+                </p:cond>
+              </p:prevCondLst>
+              <p:nextCondLst>
+                <p:cond evt="onNext" delay="0">
+                  <p:tgtEl>
+                    <p:sldTgt/>
+                  </p:tgtEl>
+                </p:cond>
+              </p:nextCondLst>
+            </p:seq>
+          </p:childTnLst>
+        </p:cTn>
+      </p:par>
+    </p:tnLst>
+  </p:timing>
+</p:sld>
+</file>
+
+<file path=ppt/slides/slide7.xml><?xml version="1.0" encoding="utf-8"?>
+<p:sld xmlns:a="http://schemas.openxmlformats.org/drawingml/2006/main" xmlns:r="http://schemas.openxmlformats.org/officeDocument/2006/relationships" xmlns:p="http://schemas.openxmlformats.org/presentationml/2006/main">
+  <p:cSld>
+    <p:spTree>
+      <p:nvGrpSpPr>
+        <p:cNvPr id="1" name=""/>
+        <p:cNvGrpSpPr/>
+        <p:nvPr/>
+      </p:nvGrpSpPr>
+      <p:grpSpPr>
+        <a:xfrm>
+          <a:off x="0" y="0"/>
+          <a:ext cx="0" cy="0"/>
+          <a:chOff x="0" y="0"/>
+          <a:chExt cx="0" cy="0"/>
+        </a:xfrm>
+      </p:grpSpPr>
+      <p:sp>
+        <p:nvSpPr>
+          <p:cNvPr id="5" name="Title 4">
+            <a:extLst>
+              <a:ext uri="{FF2B5EF4-FFF2-40B4-BE49-F238E27FC236}">
+                <a16:creationId xmlns:a16="http://schemas.microsoft.com/office/drawing/2014/main" id="{0A84CF99-998B-4D36-AE0A-6C66C12F3934}"/>
+              </a:ext>
+            </a:extLst>
+          </p:cNvPr>
+          <p:cNvSpPr>
+            <a:spLocks noGrp="1"/>
+          </p:cNvSpPr>
+          <p:nvPr>
+            <p:ph type="title"/>
+          </p:nvPr>
+        </p:nvSpPr>
+        <p:spPr/>
+        <p:txBody>
+          <a:bodyPr/>
+          <a:lstStyle/>
+          <a:p>
+            <a:r>
+              <a:rPr lang="en-US" dirty="0"/>
+              <a:t>Data Analysis</a:t>
+            </a:r>
+          </a:p>
+        </p:txBody>
+      </p:sp>
+    </p:spTree>
+    <p:extLst>
+      <p:ext uri="{BB962C8B-B14F-4D97-AF65-F5344CB8AC3E}">
+        <p14:creationId xmlns:p14="http://schemas.microsoft.com/office/powerpoint/2010/main" val="3961791241"/>
+      </p:ext>
+    </p:extLst>
+  </p:cSld>
+  <p:clrMapOvr>
+    <a:masterClrMapping/>
+  </p:clrMapOvr>
+</p:sld>
+</file>
+
+<file path=ppt/slides/slide8.xml><?xml version="1.0" encoding="utf-8"?>
+<p:sld xmlns:a="http://schemas.openxmlformats.org/drawingml/2006/main" xmlns:r="http://schemas.openxmlformats.org/officeDocument/2006/relationships" xmlns:p="http://schemas.openxmlformats.org/presentationml/2006/main">
+  <p:cSld>
+    <p:spTree>
+      <p:nvGrpSpPr>
+        <p:cNvPr id="1" name=""/>
+        <p:cNvGrpSpPr/>
+        <p:nvPr/>
+      </p:nvGrpSpPr>
+      <p:grpSpPr>
+        <a:xfrm>
+          <a:off x="0" y="0"/>
+          <a:ext cx="0" cy="0"/>
+          <a:chOff x="0" y="0"/>
+          <a:chExt cx="0" cy="0"/>
+        </a:xfrm>
+      </p:grpSpPr>
+      <p:sp>
+        <p:nvSpPr>
+          <p:cNvPr id="2" name="Title 1">
+            <a:extLst>
+              <a:ext uri="{FF2B5EF4-FFF2-40B4-BE49-F238E27FC236}">
+                <a16:creationId xmlns:a16="http://schemas.microsoft.com/office/drawing/2014/main" id="{BD4B3D39-2E2E-4FEC-ADE3-925AB11B990C}"/>
+              </a:ext>
+            </a:extLst>
+          </p:cNvPr>
+          <p:cNvSpPr>
+            <a:spLocks noGrp="1"/>
+          </p:cNvSpPr>
+          <p:nvPr>
+            <p:ph type="title"/>
+          </p:nvPr>
+        </p:nvSpPr>
+        <p:spPr/>
+        <p:txBody>
+          <a:bodyPr/>
+          <a:lstStyle/>
+          <a:p>
+            <a:r>
+              <a:rPr lang="en-US" dirty="0"/>
+              <a:t>Interesting Findings</a:t>
+            </a:r>
+          </a:p>
+        </p:txBody>
+      </p:sp>
+      <p:sp>
+        <p:nvSpPr>
+          <p:cNvPr id="3" name="TextBox 2">
+            <a:extLst>
+              <a:ext uri="{FF2B5EF4-FFF2-40B4-BE49-F238E27FC236}">
+                <a16:creationId xmlns:a16="http://schemas.microsoft.com/office/drawing/2014/main" id="{2E1CDD25-C2AE-4E87-BFCB-D724370ECCBF}"/>
+              </a:ext>
+            </a:extLst>
+          </p:cNvPr>
+          <p:cNvSpPr txBox="1"/>
+          <p:nvPr/>
+        </p:nvSpPr>
+        <p:spPr>
+          <a:xfrm>
+            <a:off x="746150" y="1770278"/>
+            <a:ext cx="10109607" cy="1323439"/>
+          </a:xfrm>
+          <a:prstGeom prst="rect">
+            <a:avLst/>
+          </a:prstGeom>
+          <a:noFill/>
+        </p:spPr>
+        <p:txBody>
+          <a:bodyPr wrap="square" rtlCol="0">
+            <a:spAutoFit/>
+          </a:bodyPr>
+          <a:lstStyle/>
+          <a:p>
+            <a:r>
+              <a:rPr lang="en-US" sz="2000" dirty="0">
+                <a:ln>
+                  <a:solidFill>
+                    <a:schemeClr val="bg1">
+                      <a:lumMod val="75000"/>
+                      <a:lumOff val="25000"/>
+                      <a:alpha val="10000"/>
+                    </a:schemeClr>
+                  </a:solidFill>
+                </a:ln>
+                <a:solidFill>
+                  <a:schemeClr val="tx2"/>
+                </a:solidFill>
+                <a:effectLst>
+                  <a:outerShdw blurRad="9525" dist="25400" dir="14640000" algn="tl" rotWithShape="0">
+                    <a:schemeClr val="bg1">
+                      <a:alpha val="30000"/>
+                    </a:schemeClr>
+                  </a:outerShdw>
+                </a:effectLst>
+                <a:latin typeface="+mj-lt"/>
+                <a:ea typeface="+mj-ea"/>
+              </a:rPr>
+              <a:t>Based on our intuition and the wider distribution, we expected that critic’s ratings would have been the better determinate of box office results but it was actually the user ratings</a:t>
+            </a:r>
+          </a:p>
+          <a:p>
+            <a:endParaRPr lang="en-US" sz="2000" dirty="0">
+              <a:ln>
+                <a:solidFill>
+                  <a:schemeClr val="bg1">
+                    <a:lumMod val="75000"/>
+                    <a:lumOff val="25000"/>
+                    <a:alpha val="10000"/>
+                  </a:schemeClr>
+                </a:solidFill>
+              </a:ln>
+              <a:solidFill>
+                <a:schemeClr val="tx2"/>
+              </a:solidFill>
+              <a:effectLst>
+                <a:outerShdw blurRad="9525" dist="25400" dir="14640000" algn="tl" rotWithShape="0">
+                  <a:schemeClr val="bg1">
+                    <a:alpha val="30000"/>
+                  </a:schemeClr>
+                </a:outerShdw>
+              </a:effectLst>
+              <a:latin typeface="+mj-lt"/>
+              <a:ea typeface="+mj-ea"/>
+            </a:endParaRPr>
+          </a:p>
+          <a:p>
+            <a:endParaRPr lang="en-US" sz="2000" dirty="0">
+              <a:ln>
+                <a:solidFill>
+                  <a:schemeClr val="bg1">
+                    <a:lumMod val="75000"/>
+                    <a:lumOff val="25000"/>
+                    <a:alpha val="10000"/>
+                  </a:schemeClr>
+                </a:solidFill>
+              </a:ln>
+              <a:solidFill>
+                <a:schemeClr val="tx2"/>
+              </a:solidFill>
+              <a:effectLst>
+                <a:outerShdw blurRad="9525" dist="25400" dir="14640000" algn="tl" rotWithShape="0">
+                  <a:schemeClr val="bg1">
+                    <a:alpha val="30000"/>
+                  </a:schemeClr>
+                </a:outerShdw>
+              </a:effectLst>
+              <a:latin typeface="+mj-lt"/>
+              <a:ea typeface="+mj-ea"/>
+            </a:endParaRPr>
+          </a:p>
+        </p:txBody>
+      </p:sp>
+    </p:spTree>
+    <p:extLst>
+      <p:ext uri="{BB962C8B-B14F-4D97-AF65-F5344CB8AC3E}">
+        <p14:creationId xmlns:p14="http://schemas.microsoft.com/office/powerpoint/2010/main" val="3466785875"/>
+      </p:ext>
+    </p:extLst>
+  </p:cSld>
+  <p:clrMapOvr>
+    <a:masterClrMapping/>
+  </p:clrMapOvr>
+</p:sld>
+</file>
+
+<file path=ppt/slides/slide9.xml><?xml version="1.0" encoding="utf-8"?>
+<p:sld xmlns:a="http://schemas.openxmlformats.org/drawingml/2006/main" xmlns:r="http://schemas.openxmlformats.org/officeDocument/2006/relationships" xmlns:p="http://schemas.openxmlformats.org/presentationml/2006/main">
+  <p:cSld>
+    <p:spTree>
+      <p:nvGrpSpPr>
+        <p:cNvPr id="1" name=""/>
+        <p:cNvGrpSpPr/>
+        <p:nvPr/>
+      </p:nvGrpSpPr>
+      <p:grpSpPr>
+        <a:xfrm>
+          <a:off x="0" y="0"/>
+          <a:ext cx="0" cy="0"/>
+          <a:chOff x="0" y="0"/>
+          <a:chExt cx="0" cy="0"/>
+        </a:xfrm>
+      </p:grpSpPr>
+      <p:sp>
+        <p:nvSpPr>
+          <p:cNvPr id="3" name="Title 2">
+            <a:extLst>
+              <a:ext uri="{FF2B5EF4-FFF2-40B4-BE49-F238E27FC236}">
+                <a16:creationId xmlns:a16="http://schemas.microsoft.com/office/drawing/2014/main" id="{80704585-8A7A-400E-89F5-7A18806249B5}"/>
+              </a:ext>
+            </a:extLst>
+          </p:cNvPr>
+          <p:cNvSpPr>
+            <a:spLocks noGrp="1"/>
+          </p:cNvSpPr>
+          <p:nvPr>
+            <p:ph type="title"/>
+          </p:nvPr>
+        </p:nvSpPr>
+        <p:spPr/>
+        <p:txBody>
+          <a:bodyPr/>
+          <a:lstStyle/>
+          <a:p>
+            <a:r>
+              <a:rPr lang="en-US" dirty="0">
+                <a:effectLst/>
+              </a:rPr>
+              <a:t>Post Mortem</a:t>
+            </a:r>
+            <a:endParaRPr lang="en-US" dirty="0"/>
+          </a:p>
+        </p:txBody>
+      </p:sp>
+      <p:sp>
+        <p:nvSpPr>
+          <p:cNvPr id="4" name="TextBox 3">
+            <a:extLst>
+              <a:ext uri="{FF2B5EF4-FFF2-40B4-BE49-F238E27FC236}">
+                <a16:creationId xmlns:a16="http://schemas.microsoft.com/office/drawing/2014/main" id="{C7F18598-C141-4BF6-83B0-3D66F0ED9164}"/>
+              </a:ext>
+            </a:extLst>
+          </p:cNvPr>
+          <p:cNvSpPr txBox="1"/>
+          <p:nvPr/>
+        </p:nvSpPr>
+        <p:spPr>
+          <a:xfrm>
+            <a:off x="607162" y="1580050"/>
+            <a:ext cx="10460736" cy="707886"/>
+          </a:xfrm>
+          <a:prstGeom prst="rect">
+            <a:avLst/>
+          </a:prstGeom>
+          <a:noFill/>
+        </p:spPr>
+        <p:txBody>
+          <a:bodyPr wrap="square" rtlCol="0">
+            <a:spAutoFit/>
+          </a:bodyPr>
+          <a:lstStyle/>
+          <a:p>
+            <a:r>
+              <a:rPr lang="en-US" sz="2000" dirty="0">
+                <a:ln>
+                  <a:solidFill>
+                    <a:schemeClr val="bg1">
+                      <a:lumMod val="75000"/>
+                      <a:lumOff val="25000"/>
+                      <a:alpha val="10000"/>
+                    </a:schemeClr>
+                  </a:solidFill>
+                </a:ln>
+                <a:solidFill>
+                  <a:schemeClr val="tx2"/>
+                </a:solidFill>
+                <a:latin typeface="+mj-lt"/>
+                <a:ea typeface="+mj-ea"/>
+              </a:rPr>
+              <a:t>We would have liked to perform a statistical analysis incorporating all the variables to see how they interact, but due deficiencies in time and expertise, we could not</a:t>
+            </a:r>
+          </a:p>
+        </p:txBody>
+      </p:sp>
+    </p:spTree>
+    <p:extLst>
+      <p:ext uri="{BB962C8B-B14F-4D97-AF65-F5344CB8AC3E}">
+        <p14:creationId xmlns:p14="http://schemas.microsoft.com/office/powerpoint/2010/main" val="2591464165"/>
       </p:ext>
     </p:extLst>
   </p:cSld>

</xml_diff>

<commit_message>
Added figures into slides
</commit_message>
<xml_diff>
--- a/Powerpoint/Presentation.pptx
+++ b/Powerpoint/Presentation.pptx
@@ -5,7 +5,7 @@
     <p:sldMasterId id="2147483660" r:id="rId1"/>
   </p:sldMasterIdLst>
   <p:notesMasterIdLst>
-    <p:notesMasterId r:id="rId11"/>
+    <p:notesMasterId r:id="rId29"/>
   </p:notesMasterIdLst>
   <p:sldIdLst>
     <p:sldId id="256" r:id="rId2"/>
@@ -14,9 +14,27 @@
     <p:sldId id="259" r:id="rId5"/>
     <p:sldId id="260" r:id="rId6"/>
     <p:sldId id="261" r:id="rId7"/>
-    <p:sldId id="262" r:id="rId8"/>
-    <p:sldId id="263" r:id="rId9"/>
-    <p:sldId id="264" r:id="rId10"/>
+    <p:sldId id="265" r:id="rId8"/>
+    <p:sldId id="266" r:id="rId9"/>
+    <p:sldId id="267" r:id="rId10"/>
+    <p:sldId id="268" r:id="rId11"/>
+    <p:sldId id="269" r:id="rId12"/>
+    <p:sldId id="270" r:id="rId13"/>
+    <p:sldId id="271" r:id="rId14"/>
+    <p:sldId id="272" r:id="rId15"/>
+    <p:sldId id="273" r:id="rId16"/>
+    <p:sldId id="274" r:id="rId17"/>
+    <p:sldId id="275" r:id="rId18"/>
+    <p:sldId id="276" r:id="rId19"/>
+    <p:sldId id="277" r:id="rId20"/>
+    <p:sldId id="278" r:id="rId21"/>
+    <p:sldId id="279" r:id="rId22"/>
+    <p:sldId id="280" r:id="rId23"/>
+    <p:sldId id="281" r:id="rId24"/>
+    <p:sldId id="282" r:id="rId25"/>
+    <p:sldId id="283" r:id="rId26"/>
+    <p:sldId id="263" r:id="rId27"/>
+    <p:sldId id="264" r:id="rId28"/>
   </p:sldIdLst>
   <p:sldSz cx="12192000" cy="6858000"/>
   <p:notesSz cx="6858000" cy="9144000"/>
@@ -205,7 +223,7 @@
           <a:p>
             <a:fld id="{2DB84107-8B38-4773-9B9E-EBEA65E35D1E}" type="datetimeFigureOut">
               <a:rPr lang="en-US" smtClean="0"/>
-              <a:t>3/7/2019</a:t>
+              <a:t>3/9/2019</a:t>
             </a:fld>
             <a:endParaRPr lang="en-US"/>
           </a:p>
@@ -643,6 +661,90 @@
 </p:notes>
 </file>
 
+<file path=ppt/notesSlides/notesSlide3.xml><?xml version="1.0" encoding="utf-8"?>
+<p:notes xmlns:a="http://schemas.openxmlformats.org/drawingml/2006/main" xmlns:r="http://schemas.openxmlformats.org/officeDocument/2006/relationships" xmlns:p="http://schemas.openxmlformats.org/presentationml/2006/main">
+  <p:cSld>
+    <p:spTree>
+      <p:nvGrpSpPr>
+        <p:cNvPr id="1" name=""/>
+        <p:cNvGrpSpPr/>
+        <p:nvPr/>
+      </p:nvGrpSpPr>
+      <p:grpSpPr>
+        <a:xfrm>
+          <a:off x="0" y="0"/>
+          <a:ext cx="0" cy="0"/>
+          <a:chOff x="0" y="0"/>
+          <a:chExt cx="0" cy="0"/>
+        </a:xfrm>
+      </p:grpSpPr>
+      <p:sp>
+        <p:nvSpPr>
+          <p:cNvPr id="2" name="Slide Image Placeholder 1"/>
+          <p:cNvSpPr>
+            <a:spLocks noGrp="1" noRot="1" noChangeAspect="1"/>
+          </p:cNvSpPr>
+          <p:nvPr>
+            <p:ph type="sldImg"/>
+          </p:nvPr>
+        </p:nvSpPr>
+        <p:spPr/>
+      </p:sp>
+      <p:sp>
+        <p:nvSpPr>
+          <p:cNvPr id="3" name="Notes Placeholder 2"/>
+          <p:cNvSpPr>
+            <a:spLocks noGrp="1"/>
+          </p:cNvSpPr>
+          <p:nvPr>
+            <p:ph type="body" idx="1"/>
+          </p:nvPr>
+        </p:nvSpPr>
+        <p:spPr/>
+        <p:txBody>
+          <a:bodyPr/>
+          <a:lstStyle/>
+          <a:p>
+            <a:endParaRPr lang="en-US" dirty="0"/>
+          </a:p>
+        </p:txBody>
+      </p:sp>
+      <p:sp>
+        <p:nvSpPr>
+          <p:cNvPr id="4" name="Slide Number Placeholder 3"/>
+          <p:cNvSpPr>
+            <a:spLocks noGrp="1"/>
+          </p:cNvSpPr>
+          <p:nvPr>
+            <p:ph type="sldNum" sz="quarter" idx="5"/>
+          </p:nvPr>
+        </p:nvSpPr>
+        <p:spPr/>
+        <p:txBody>
+          <a:bodyPr/>
+          <a:lstStyle/>
+          <a:p>
+            <a:fld id="{003A55BB-3198-42C5-8E0C-DB7DB2B7DC8C}" type="slidenum">
+              <a:rPr lang="en-US" smtClean="0"/>
+              <a:t>12</a:t>
+            </a:fld>
+            <a:endParaRPr lang="en-US"/>
+          </a:p>
+        </p:txBody>
+      </p:sp>
+    </p:spTree>
+    <p:extLst>
+      <p:ext uri="{BB962C8B-B14F-4D97-AF65-F5344CB8AC3E}">
+        <p14:creationId xmlns:p14="http://schemas.microsoft.com/office/powerpoint/2010/main" val="1919046887"/>
+      </p:ext>
+    </p:extLst>
+  </p:cSld>
+  <p:clrMapOvr>
+    <a:masterClrMapping/>
+  </p:clrMapOvr>
+</p:notes>
+</file>
+
 <file path=ppt/slideLayouts/slideLayout1.xml><?xml version="1.0" encoding="utf-8"?>
 <p:sldLayout xmlns:a="http://schemas.openxmlformats.org/drawingml/2006/main" xmlns:r="http://schemas.openxmlformats.org/officeDocument/2006/relationships" xmlns:p="http://schemas.openxmlformats.org/presentationml/2006/main" type="title" preserve="1">
   <p:cSld name="Title Slide">
@@ -828,7 +930,7 @@
           <a:p>
             <a:fld id="{BB674D78-4E27-4D24-86BA-5CC161815A44}" type="datetimeFigureOut">
               <a:rPr lang="en-US" smtClean="0"/>
-              <a:t>3/7/2019</a:t>
+              <a:t>3/9/2019</a:t>
             </a:fld>
             <a:endParaRPr lang="en-US"/>
           </a:p>
@@ -1126,7 +1228,7 @@
           <a:p>
             <a:fld id="{BB674D78-4E27-4D24-86BA-5CC161815A44}" type="datetimeFigureOut">
               <a:rPr lang="en-US" smtClean="0"/>
-              <a:t>3/7/2019</a:t>
+              <a:t>3/9/2019</a:t>
             </a:fld>
             <a:endParaRPr lang="en-US"/>
           </a:p>
@@ -1318,7 +1420,7 @@
           <a:p>
             <a:fld id="{BB674D78-4E27-4D24-86BA-5CC161815A44}" type="datetimeFigureOut">
               <a:rPr lang="en-US" smtClean="0"/>
-              <a:t>3/7/2019</a:t>
+              <a:t>3/9/2019</a:t>
             </a:fld>
             <a:endParaRPr lang="en-US"/>
           </a:p>
@@ -1579,7 +1681,7 @@
           <a:p>
             <a:fld id="{BB674D78-4E27-4D24-86BA-5CC161815A44}" type="datetimeFigureOut">
               <a:rPr lang="en-US" smtClean="0"/>
-              <a:t>3/7/2019</a:t>
+              <a:t>3/9/2019</a:t>
             </a:fld>
             <a:endParaRPr lang="en-US"/>
           </a:p>
@@ -2003,7 +2105,7 @@
           <a:p>
             <a:fld id="{BB674D78-4E27-4D24-86BA-5CC161815A44}" type="datetimeFigureOut">
               <a:rPr lang="en-US" smtClean="0"/>
-              <a:t>3/7/2019</a:t>
+              <a:t>3/9/2019</a:t>
             </a:fld>
             <a:endParaRPr lang="en-US"/>
           </a:p>
@@ -2540,7 +2642,7 @@
           <a:p>
             <a:fld id="{BB674D78-4E27-4D24-86BA-5CC161815A44}" type="datetimeFigureOut">
               <a:rPr lang="en-US" smtClean="0"/>
-              <a:t>3/7/2019</a:t>
+              <a:t>3/9/2019</a:t>
             </a:fld>
             <a:endParaRPr lang="en-US"/>
           </a:p>
@@ -3404,7 +3506,7 @@
           <a:p>
             <a:fld id="{BB674D78-4E27-4D24-86BA-5CC161815A44}" type="datetimeFigureOut">
               <a:rPr lang="en-US" smtClean="0"/>
-              <a:t>3/7/2019</a:t>
+              <a:t>3/9/2019</a:t>
             </a:fld>
             <a:endParaRPr lang="en-US"/>
           </a:p>
@@ -3574,7 +3676,7 @@
           <a:p>
             <a:fld id="{BB674D78-4E27-4D24-86BA-5CC161815A44}" type="datetimeFigureOut">
               <a:rPr lang="en-US" smtClean="0"/>
-              <a:t>3/7/2019</a:t>
+              <a:t>3/9/2019</a:t>
             </a:fld>
             <a:endParaRPr lang="en-US"/>
           </a:p>
@@ -3758,7 +3860,7 @@
           <a:p>
             <a:fld id="{BB674D78-4E27-4D24-86BA-5CC161815A44}" type="datetimeFigureOut">
               <a:rPr lang="en-US" smtClean="0"/>
-              <a:t>3/7/2019</a:t>
+              <a:t>3/9/2019</a:t>
             </a:fld>
             <a:endParaRPr lang="en-US"/>
           </a:p>
@@ -3928,7 +4030,7 @@
           <a:p>
             <a:fld id="{BB674D78-4E27-4D24-86BA-5CC161815A44}" type="datetimeFigureOut">
               <a:rPr lang="en-US" smtClean="0"/>
-              <a:t>3/7/2019</a:t>
+              <a:t>3/9/2019</a:t>
             </a:fld>
             <a:endParaRPr lang="en-US"/>
           </a:p>
@@ -4172,7 +4274,7 @@
           <a:p>
             <a:fld id="{BB674D78-4E27-4D24-86BA-5CC161815A44}" type="datetimeFigureOut">
               <a:rPr lang="en-US" smtClean="0"/>
-              <a:t>3/7/2019</a:t>
+              <a:t>3/9/2019</a:t>
             </a:fld>
             <a:endParaRPr lang="en-US"/>
           </a:p>
@@ -4408,7 +4510,7 @@
           <a:p>
             <a:fld id="{BB674D78-4E27-4D24-86BA-5CC161815A44}" type="datetimeFigureOut">
               <a:rPr lang="en-US" smtClean="0"/>
-              <a:t>3/7/2019</a:t>
+              <a:t>3/9/2019</a:t>
             </a:fld>
             <a:endParaRPr lang="en-US"/>
           </a:p>
@@ -4874,7 +4976,7 @@
           <a:p>
             <a:fld id="{BB674D78-4E27-4D24-86BA-5CC161815A44}" type="datetimeFigureOut">
               <a:rPr lang="en-US" smtClean="0"/>
-              <a:t>3/7/2019</a:t>
+              <a:t>3/9/2019</a:t>
             </a:fld>
             <a:endParaRPr lang="en-US"/>
           </a:p>
@@ -4992,7 +5094,7 @@
           <a:p>
             <a:fld id="{BB674D78-4E27-4D24-86BA-5CC161815A44}" type="datetimeFigureOut">
               <a:rPr lang="en-US" smtClean="0"/>
-              <a:t>3/7/2019</a:t>
+              <a:t>3/9/2019</a:t>
             </a:fld>
             <a:endParaRPr lang="en-US"/>
           </a:p>
@@ -5087,7 +5189,7 @@
           <a:p>
             <a:fld id="{BB674D78-4E27-4D24-86BA-5CC161815A44}" type="datetimeFigureOut">
               <a:rPr lang="en-US" smtClean="0"/>
-              <a:t>3/7/2019</a:t>
+              <a:t>3/9/2019</a:t>
             </a:fld>
             <a:endParaRPr lang="en-US"/>
           </a:p>
@@ -5342,7 +5444,7 @@
           <a:p>
             <a:fld id="{BB674D78-4E27-4D24-86BA-5CC161815A44}" type="datetimeFigureOut">
               <a:rPr lang="en-US" smtClean="0"/>
-              <a:t>3/7/2019</a:t>
+              <a:t>3/9/2019</a:t>
             </a:fld>
             <a:endParaRPr lang="en-US"/>
           </a:p>
@@ -5642,7 +5744,7 @@
           <a:p>
             <a:fld id="{BB674D78-4E27-4D24-86BA-5CC161815A44}" type="datetimeFigureOut">
               <a:rPr lang="en-US" smtClean="0"/>
-              <a:t>3/7/2019</a:t>
+              <a:t>3/9/2019</a:t>
             </a:fld>
             <a:endParaRPr lang="en-US"/>
           </a:p>
@@ -5876,7 +5978,7 @@
           <a:p>
             <a:fld id="{BB674D78-4E27-4D24-86BA-5CC161815A44}" type="datetimeFigureOut">
               <a:rPr lang="en-US" smtClean="0"/>
-              <a:t>3/7/2019</a:t>
+              <a:t>3/9/2019</a:t>
             </a:fld>
             <a:endParaRPr lang="en-US"/>
           </a:p>
@@ -6725,6 +6827,986 @@
 </p:sld>
 </file>
 
+<file path=ppt/slides/slide10.xml><?xml version="1.0" encoding="utf-8"?>
+<p:sld xmlns:a="http://schemas.openxmlformats.org/drawingml/2006/main" xmlns:r="http://schemas.openxmlformats.org/officeDocument/2006/relationships" xmlns:p="http://schemas.openxmlformats.org/presentationml/2006/main">
+  <p:cSld>
+    <p:spTree>
+      <p:nvGrpSpPr>
+        <p:cNvPr id="1" name=""/>
+        <p:cNvGrpSpPr/>
+        <p:nvPr/>
+      </p:nvGrpSpPr>
+      <p:grpSpPr>
+        <a:xfrm>
+          <a:off x="0" y="0"/>
+          <a:ext cx="0" cy="0"/>
+          <a:chOff x="0" y="0"/>
+          <a:chExt cx="0" cy="0"/>
+        </a:xfrm>
+      </p:grpSpPr>
+      <p:sp>
+        <p:nvSpPr>
+          <p:cNvPr id="5" name="Title 4">
+            <a:extLst>
+              <a:ext uri="{FF2B5EF4-FFF2-40B4-BE49-F238E27FC236}">
+                <a16:creationId xmlns:a16="http://schemas.microsoft.com/office/drawing/2014/main" id="{0A84CF99-998B-4D36-AE0A-6C66C12F3934}"/>
+              </a:ext>
+            </a:extLst>
+          </p:cNvPr>
+          <p:cNvSpPr>
+            <a:spLocks noGrp="1"/>
+          </p:cNvSpPr>
+          <p:nvPr>
+            <p:ph type="title"/>
+          </p:nvPr>
+        </p:nvSpPr>
+        <p:spPr/>
+        <p:txBody>
+          <a:bodyPr/>
+          <a:lstStyle/>
+          <a:p>
+            <a:r>
+              <a:rPr lang="en-US" dirty="0"/>
+              <a:t>Data Analysis</a:t>
+            </a:r>
+          </a:p>
+        </p:txBody>
+      </p:sp>
+      <p:pic>
+        <p:nvPicPr>
+          <p:cNvPr id="2" name="Picture 1">
+            <a:extLst>
+              <a:ext uri="{FF2B5EF4-FFF2-40B4-BE49-F238E27FC236}">
+                <a16:creationId xmlns:a16="http://schemas.microsoft.com/office/drawing/2014/main" id="{ED5E3B73-0970-4269-92B5-3C2F5C21F3C9}"/>
+              </a:ext>
+            </a:extLst>
+          </p:cNvPr>
+          <p:cNvPicPr>
+            <a:picLocks noChangeAspect="1"/>
+          </p:cNvPicPr>
+          <p:nvPr/>
+        </p:nvPicPr>
+        <p:blipFill>
+          <a:blip r:embed="rId2"/>
+          <a:stretch>
+            <a:fillRect/>
+          </a:stretch>
+        </p:blipFill>
+        <p:spPr>
+          <a:xfrm>
+            <a:off x="3334634" y="596754"/>
+            <a:ext cx="5512083" cy="5664491"/>
+          </a:xfrm>
+          <a:prstGeom prst="rect">
+            <a:avLst/>
+          </a:prstGeom>
+        </p:spPr>
+      </p:pic>
+    </p:spTree>
+    <p:extLst>
+      <p:ext uri="{BB962C8B-B14F-4D97-AF65-F5344CB8AC3E}">
+        <p14:creationId xmlns:p14="http://schemas.microsoft.com/office/powerpoint/2010/main" val="3972032798"/>
+      </p:ext>
+    </p:extLst>
+  </p:cSld>
+  <p:clrMapOvr>
+    <a:masterClrMapping/>
+  </p:clrMapOvr>
+</p:sld>
+</file>
+
+<file path=ppt/slides/slide11.xml><?xml version="1.0" encoding="utf-8"?>
+<p:sld xmlns:a="http://schemas.openxmlformats.org/drawingml/2006/main" xmlns:r="http://schemas.openxmlformats.org/officeDocument/2006/relationships" xmlns:p="http://schemas.openxmlformats.org/presentationml/2006/main">
+  <p:cSld>
+    <p:spTree>
+      <p:nvGrpSpPr>
+        <p:cNvPr id="1" name=""/>
+        <p:cNvGrpSpPr/>
+        <p:nvPr/>
+      </p:nvGrpSpPr>
+      <p:grpSpPr>
+        <a:xfrm>
+          <a:off x="0" y="0"/>
+          <a:ext cx="0" cy="0"/>
+          <a:chOff x="0" y="0"/>
+          <a:chExt cx="0" cy="0"/>
+        </a:xfrm>
+      </p:grpSpPr>
+      <p:sp>
+        <p:nvSpPr>
+          <p:cNvPr id="5" name="Title 4">
+            <a:extLst>
+              <a:ext uri="{FF2B5EF4-FFF2-40B4-BE49-F238E27FC236}">
+                <a16:creationId xmlns:a16="http://schemas.microsoft.com/office/drawing/2014/main" id="{0A84CF99-998B-4D36-AE0A-6C66C12F3934}"/>
+              </a:ext>
+            </a:extLst>
+          </p:cNvPr>
+          <p:cNvSpPr>
+            <a:spLocks noGrp="1"/>
+          </p:cNvSpPr>
+          <p:nvPr>
+            <p:ph type="title"/>
+          </p:nvPr>
+        </p:nvSpPr>
+        <p:spPr/>
+        <p:txBody>
+          <a:bodyPr/>
+          <a:lstStyle/>
+          <a:p>
+            <a:r>
+              <a:rPr lang="en-US" dirty="0"/>
+              <a:t>Genre and Box Office Performance</a:t>
+            </a:r>
+          </a:p>
+        </p:txBody>
+      </p:sp>
+      <p:pic>
+        <p:nvPicPr>
+          <p:cNvPr id="3" name="Picture 2" descr="A screenshot of a cell phone&#10;&#10;Description automatically generated">
+            <a:extLst>
+              <a:ext uri="{FF2B5EF4-FFF2-40B4-BE49-F238E27FC236}">
+                <a16:creationId xmlns:a16="http://schemas.microsoft.com/office/drawing/2014/main" id="{B632C93C-ECC5-4EF0-BEE7-1E0A6E41C85C}"/>
+              </a:ext>
+            </a:extLst>
+          </p:cNvPr>
+          <p:cNvPicPr>
+            <a:picLocks noChangeAspect="1"/>
+          </p:cNvPicPr>
+          <p:nvPr/>
+        </p:nvPicPr>
+        <p:blipFill>
+          <a:blip r:embed="rId2">
+            <a:extLst>
+              <a:ext uri="{28A0092B-C50C-407E-A947-70E740481C1C}">
+                <a14:useLocalDpi xmlns:a14="http://schemas.microsoft.com/office/drawing/2010/main" val="0"/>
+              </a:ext>
+            </a:extLst>
+          </a:blip>
+          <a:stretch>
+            <a:fillRect/>
+          </a:stretch>
+        </p:blipFill>
+        <p:spPr>
+          <a:xfrm>
+            <a:off x="2739220" y="1779792"/>
+            <a:ext cx="6702912" cy="4468608"/>
+          </a:xfrm>
+          <a:prstGeom prst="rect">
+            <a:avLst/>
+          </a:prstGeom>
+        </p:spPr>
+      </p:pic>
+    </p:spTree>
+    <p:extLst>
+      <p:ext uri="{BB962C8B-B14F-4D97-AF65-F5344CB8AC3E}">
+        <p14:creationId xmlns:p14="http://schemas.microsoft.com/office/powerpoint/2010/main" val="3051296002"/>
+      </p:ext>
+    </p:extLst>
+  </p:cSld>
+  <p:clrMapOvr>
+    <a:masterClrMapping/>
+  </p:clrMapOvr>
+</p:sld>
+</file>
+
+<file path=ppt/slides/slide12.xml><?xml version="1.0" encoding="utf-8"?>
+<p:sld xmlns:a="http://schemas.openxmlformats.org/drawingml/2006/main" xmlns:r="http://schemas.openxmlformats.org/officeDocument/2006/relationships" xmlns:p="http://schemas.openxmlformats.org/presentationml/2006/main">
+  <p:cSld>
+    <p:spTree>
+      <p:nvGrpSpPr>
+        <p:cNvPr id="1" name=""/>
+        <p:cNvGrpSpPr/>
+        <p:nvPr/>
+      </p:nvGrpSpPr>
+      <p:grpSpPr>
+        <a:xfrm>
+          <a:off x="0" y="0"/>
+          <a:ext cx="0" cy="0"/>
+          <a:chOff x="0" y="0"/>
+          <a:chExt cx="0" cy="0"/>
+        </a:xfrm>
+      </p:grpSpPr>
+      <p:sp>
+        <p:nvSpPr>
+          <p:cNvPr id="5" name="Title 4">
+            <a:extLst>
+              <a:ext uri="{FF2B5EF4-FFF2-40B4-BE49-F238E27FC236}">
+                <a16:creationId xmlns:a16="http://schemas.microsoft.com/office/drawing/2014/main" id="{0A84CF99-998B-4D36-AE0A-6C66C12F3934}"/>
+              </a:ext>
+            </a:extLst>
+          </p:cNvPr>
+          <p:cNvSpPr>
+            <a:spLocks noGrp="1"/>
+          </p:cNvSpPr>
+          <p:nvPr>
+            <p:ph type="title"/>
+          </p:nvPr>
+        </p:nvSpPr>
+        <p:spPr/>
+        <p:txBody>
+          <a:bodyPr/>
+          <a:lstStyle/>
+          <a:p>
+            <a:r>
+              <a:rPr lang="en-US" dirty="0"/>
+              <a:t>Genre and Box Office Performance</a:t>
+            </a:r>
+          </a:p>
+        </p:txBody>
+      </p:sp>
+      <p:pic>
+        <p:nvPicPr>
+          <p:cNvPr id="3" name="Picture 2" descr="A close up of a map&#10;&#10;Description automatically generated">
+            <a:extLst>
+              <a:ext uri="{FF2B5EF4-FFF2-40B4-BE49-F238E27FC236}">
+                <a16:creationId xmlns:a16="http://schemas.microsoft.com/office/drawing/2014/main" id="{76F65076-6E59-4CE3-A82E-8F5523430CDD}"/>
+              </a:ext>
+            </a:extLst>
+          </p:cNvPr>
+          <p:cNvPicPr>
+            <a:picLocks noChangeAspect="1"/>
+          </p:cNvPicPr>
+          <p:nvPr/>
+        </p:nvPicPr>
+        <p:blipFill>
+          <a:blip r:embed="rId3">
+            <a:extLst>
+              <a:ext uri="{28A0092B-C50C-407E-A947-70E740481C1C}">
+                <a14:useLocalDpi xmlns:a14="http://schemas.microsoft.com/office/drawing/2010/main" val="0"/>
+              </a:ext>
+            </a:extLst>
+          </a:blip>
+          <a:stretch>
+            <a:fillRect/>
+          </a:stretch>
+        </p:blipFill>
+        <p:spPr>
+          <a:xfrm>
+            <a:off x="2661363" y="1675983"/>
+            <a:ext cx="6858626" cy="4572417"/>
+          </a:xfrm>
+          <a:prstGeom prst="rect">
+            <a:avLst/>
+          </a:prstGeom>
+        </p:spPr>
+      </p:pic>
+    </p:spTree>
+    <p:extLst>
+      <p:ext uri="{BB962C8B-B14F-4D97-AF65-F5344CB8AC3E}">
+        <p14:creationId xmlns:p14="http://schemas.microsoft.com/office/powerpoint/2010/main" val="1741940324"/>
+      </p:ext>
+    </p:extLst>
+  </p:cSld>
+  <p:clrMapOvr>
+    <a:masterClrMapping/>
+  </p:clrMapOvr>
+</p:sld>
+</file>
+
+<file path=ppt/slides/slide13.xml><?xml version="1.0" encoding="utf-8"?>
+<p:sld xmlns:a="http://schemas.openxmlformats.org/drawingml/2006/main" xmlns:r="http://schemas.openxmlformats.org/officeDocument/2006/relationships" xmlns:p="http://schemas.openxmlformats.org/presentationml/2006/main">
+  <p:cSld>
+    <p:spTree>
+      <p:nvGrpSpPr>
+        <p:cNvPr id="1" name=""/>
+        <p:cNvGrpSpPr/>
+        <p:nvPr/>
+      </p:nvGrpSpPr>
+      <p:grpSpPr>
+        <a:xfrm>
+          <a:off x="0" y="0"/>
+          <a:ext cx="0" cy="0"/>
+          <a:chOff x="0" y="0"/>
+          <a:chExt cx="0" cy="0"/>
+        </a:xfrm>
+      </p:grpSpPr>
+      <p:sp>
+        <p:nvSpPr>
+          <p:cNvPr id="5" name="Title 4">
+            <a:extLst>
+              <a:ext uri="{FF2B5EF4-FFF2-40B4-BE49-F238E27FC236}">
+                <a16:creationId xmlns:a16="http://schemas.microsoft.com/office/drawing/2014/main" id="{0A84CF99-998B-4D36-AE0A-6C66C12F3934}"/>
+              </a:ext>
+            </a:extLst>
+          </p:cNvPr>
+          <p:cNvSpPr>
+            <a:spLocks noGrp="1"/>
+          </p:cNvSpPr>
+          <p:nvPr>
+            <p:ph type="title"/>
+          </p:nvPr>
+        </p:nvSpPr>
+        <p:spPr/>
+        <p:txBody>
+          <a:bodyPr/>
+          <a:lstStyle/>
+          <a:p>
+            <a:r>
+              <a:rPr lang="en-US" dirty="0"/>
+              <a:t>MPAA Rating</a:t>
+            </a:r>
+          </a:p>
+        </p:txBody>
+      </p:sp>
+      <p:pic>
+        <p:nvPicPr>
+          <p:cNvPr id="3" name="Picture 2">
+            <a:extLst>
+              <a:ext uri="{FF2B5EF4-FFF2-40B4-BE49-F238E27FC236}">
+                <a16:creationId xmlns:a16="http://schemas.microsoft.com/office/drawing/2014/main" id="{9981195E-E150-430C-B697-92383B0DEFA0}"/>
+              </a:ext>
+            </a:extLst>
+          </p:cNvPr>
+          <p:cNvPicPr>
+            <a:picLocks noChangeAspect="1"/>
+          </p:cNvPicPr>
+          <p:nvPr/>
+        </p:nvPicPr>
+        <p:blipFill>
+          <a:blip r:embed="rId2">
+            <a:extLst>
+              <a:ext uri="{28A0092B-C50C-407E-A947-70E740481C1C}">
+                <a14:useLocalDpi xmlns:a14="http://schemas.microsoft.com/office/drawing/2010/main" val="0"/>
+              </a:ext>
+            </a:extLst>
+          </a:blip>
+          <a:stretch>
+            <a:fillRect/>
+          </a:stretch>
+        </p:blipFill>
+        <p:spPr>
+          <a:xfrm>
+            <a:off x="1517634" y="1580050"/>
+            <a:ext cx="9146084" cy="4573042"/>
+          </a:xfrm>
+          <a:prstGeom prst="rect">
+            <a:avLst/>
+          </a:prstGeom>
+        </p:spPr>
+      </p:pic>
+    </p:spTree>
+    <p:extLst>
+      <p:ext uri="{BB962C8B-B14F-4D97-AF65-F5344CB8AC3E}">
+        <p14:creationId xmlns:p14="http://schemas.microsoft.com/office/powerpoint/2010/main" val="3117690737"/>
+      </p:ext>
+    </p:extLst>
+  </p:cSld>
+  <p:clrMapOvr>
+    <a:masterClrMapping/>
+  </p:clrMapOvr>
+</p:sld>
+</file>
+
+<file path=ppt/slides/slide14.xml><?xml version="1.0" encoding="utf-8"?>
+<p:sld xmlns:a="http://schemas.openxmlformats.org/drawingml/2006/main" xmlns:r="http://schemas.openxmlformats.org/officeDocument/2006/relationships" xmlns:p="http://schemas.openxmlformats.org/presentationml/2006/main">
+  <p:cSld>
+    <p:spTree>
+      <p:nvGrpSpPr>
+        <p:cNvPr id="1" name=""/>
+        <p:cNvGrpSpPr/>
+        <p:nvPr/>
+      </p:nvGrpSpPr>
+      <p:grpSpPr>
+        <a:xfrm>
+          <a:off x="0" y="0"/>
+          <a:ext cx="0" cy="0"/>
+          <a:chOff x="0" y="0"/>
+          <a:chExt cx="0" cy="0"/>
+        </a:xfrm>
+      </p:grpSpPr>
+      <p:sp>
+        <p:nvSpPr>
+          <p:cNvPr id="5" name="Title 4">
+            <a:extLst>
+              <a:ext uri="{FF2B5EF4-FFF2-40B4-BE49-F238E27FC236}">
+                <a16:creationId xmlns:a16="http://schemas.microsoft.com/office/drawing/2014/main" id="{0A84CF99-998B-4D36-AE0A-6C66C12F3934}"/>
+              </a:ext>
+            </a:extLst>
+          </p:cNvPr>
+          <p:cNvSpPr>
+            <a:spLocks noGrp="1"/>
+          </p:cNvSpPr>
+          <p:nvPr>
+            <p:ph type="title"/>
+          </p:nvPr>
+        </p:nvSpPr>
+        <p:spPr/>
+        <p:txBody>
+          <a:bodyPr/>
+          <a:lstStyle/>
+          <a:p>
+            <a:r>
+              <a:rPr lang="en-US" dirty="0"/>
+              <a:t>MPAA Rating</a:t>
+            </a:r>
+          </a:p>
+        </p:txBody>
+      </p:sp>
+      <p:pic>
+        <p:nvPicPr>
+          <p:cNvPr id="3" name="Picture 2" descr="A picture containing vector graphics&#10;&#10;Description automatically generated">
+            <a:extLst>
+              <a:ext uri="{FF2B5EF4-FFF2-40B4-BE49-F238E27FC236}">
+                <a16:creationId xmlns:a16="http://schemas.microsoft.com/office/drawing/2014/main" id="{96F8826F-C36B-41C1-AFD8-B08ED9A6EBAC}"/>
+              </a:ext>
+            </a:extLst>
+          </p:cNvPr>
+          <p:cNvPicPr>
+            <a:picLocks noChangeAspect="1"/>
+          </p:cNvPicPr>
+          <p:nvPr/>
+        </p:nvPicPr>
+        <p:blipFill>
+          <a:blip r:embed="rId2">
+            <a:extLst>
+              <a:ext uri="{28A0092B-C50C-407E-A947-70E740481C1C}">
+                <a14:useLocalDpi xmlns:a14="http://schemas.microsoft.com/office/drawing/2010/main" val="0"/>
+              </a:ext>
+            </a:extLst>
+          </a:blip>
+          <a:stretch>
+            <a:fillRect/>
+          </a:stretch>
+        </p:blipFill>
+        <p:spPr>
+          <a:xfrm>
+            <a:off x="3766257" y="1674673"/>
+            <a:ext cx="4659485" cy="4573727"/>
+          </a:xfrm>
+          <a:prstGeom prst="rect">
+            <a:avLst/>
+          </a:prstGeom>
+        </p:spPr>
+      </p:pic>
+    </p:spTree>
+    <p:extLst>
+      <p:ext uri="{BB962C8B-B14F-4D97-AF65-F5344CB8AC3E}">
+        <p14:creationId xmlns:p14="http://schemas.microsoft.com/office/powerpoint/2010/main" val="1659342728"/>
+      </p:ext>
+    </p:extLst>
+  </p:cSld>
+  <p:clrMapOvr>
+    <a:masterClrMapping/>
+  </p:clrMapOvr>
+</p:sld>
+</file>
+
+<file path=ppt/slides/slide15.xml><?xml version="1.0" encoding="utf-8"?>
+<p:sld xmlns:a="http://schemas.openxmlformats.org/drawingml/2006/main" xmlns:r="http://schemas.openxmlformats.org/officeDocument/2006/relationships" xmlns:p="http://schemas.openxmlformats.org/presentationml/2006/main">
+  <p:cSld>
+    <p:spTree>
+      <p:nvGrpSpPr>
+        <p:cNvPr id="1" name=""/>
+        <p:cNvGrpSpPr/>
+        <p:nvPr/>
+      </p:nvGrpSpPr>
+      <p:grpSpPr>
+        <a:xfrm>
+          <a:off x="0" y="0"/>
+          <a:ext cx="0" cy="0"/>
+          <a:chOff x="0" y="0"/>
+          <a:chExt cx="0" cy="0"/>
+        </a:xfrm>
+      </p:grpSpPr>
+      <p:sp>
+        <p:nvSpPr>
+          <p:cNvPr id="5" name="Title 4">
+            <a:extLst>
+              <a:ext uri="{FF2B5EF4-FFF2-40B4-BE49-F238E27FC236}">
+                <a16:creationId xmlns:a16="http://schemas.microsoft.com/office/drawing/2014/main" id="{0A84CF99-998B-4D36-AE0A-6C66C12F3934}"/>
+              </a:ext>
+            </a:extLst>
+          </p:cNvPr>
+          <p:cNvSpPr>
+            <a:spLocks noGrp="1"/>
+          </p:cNvSpPr>
+          <p:nvPr>
+            <p:ph type="title"/>
+          </p:nvPr>
+        </p:nvSpPr>
+        <p:spPr/>
+        <p:txBody>
+          <a:bodyPr/>
+          <a:lstStyle/>
+          <a:p>
+            <a:r>
+              <a:rPr lang="en-US" dirty="0"/>
+              <a:t>MPAA Rating</a:t>
+            </a:r>
+          </a:p>
+        </p:txBody>
+      </p:sp>
+      <p:pic>
+        <p:nvPicPr>
+          <p:cNvPr id="4" name="Picture 3" descr="A picture containing screenshot&#10;&#10;Description automatically generated">
+            <a:extLst>
+              <a:ext uri="{FF2B5EF4-FFF2-40B4-BE49-F238E27FC236}">
+                <a16:creationId xmlns:a16="http://schemas.microsoft.com/office/drawing/2014/main" id="{39C9F162-3E55-43B0-AF4C-4FCDC622CA4A}"/>
+              </a:ext>
+            </a:extLst>
+          </p:cNvPr>
+          <p:cNvPicPr>
+            <a:picLocks noChangeAspect="1"/>
+          </p:cNvPicPr>
+          <p:nvPr/>
+        </p:nvPicPr>
+        <p:blipFill>
+          <a:blip r:embed="rId2">
+            <a:extLst>
+              <a:ext uri="{28A0092B-C50C-407E-A947-70E740481C1C}">
+                <a14:useLocalDpi xmlns:a14="http://schemas.microsoft.com/office/drawing/2010/main" val="0"/>
+              </a:ext>
+            </a:extLst>
+          </a:blip>
+          <a:stretch>
+            <a:fillRect/>
+          </a:stretch>
+        </p:blipFill>
+        <p:spPr>
+          <a:xfrm>
+            <a:off x="1540211" y="1697935"/>
+            <a:ext cx="9100930" cy="4550465"/>
+          </a:xfrm>
+          <a:prstGeom prst="rect">
+            <a:avLst/>
+          </a:prstGeom>
+        </p:spPr>
+      </p:pic>
+      <p:sp>
+        <p:nvSpPr>
+          <p:cNvPr id="8" name="Rectangle 7">
+            <a:extLst>
+              <a:ext uri="{FF2B5EF4-FFF2-40B4-BE49-F238E27FC236}">
+                <a16:creationId xmlns:a16="http://schemas.microsoft.com/office/drawing/2014/main" id="{1731C29D-B9BB-4CD2-B3F9-7E9439340438}"/>
+              </a:ext>
+            </a:extLst>
+          </p:cNvPr>
+          <p:cNvSpPr/>
+          <p:nvPr/>
+        </p:nvSpPr>
+        <p:spPr>
+          <a:xfrm>
+            <a:off x="2088519" y="6248400"/>
+            <a:ext cx="8004313" cy="369332"/>
+          </a:xfrm>
+          <a:prstGeom prst="rect">
+            <a:avLst/>
+          </a:prstGeom>
+        </p:spPr>
+        <p:txBody>
+          <a:bodyPr wrap="square">
+            <a:spAutoFit/>
+          </a:bodyPr>
+          <a:lstStyle/>
+          <a:p>
+            <a:r>
+              <a:rPr lang="en-US" dirty="0" err="1"/>
+              <a:t>F_onewayResult</a:t>
+            </a:r>
+            <a:r>
+              <a:rPr lang="en-US" dirty="0"/>
+              <a:t>(statistic=29.37724940787404, </a:t>
+            </a:r>
+            <a:r>
+              <a:rPr lang="en-US" dirty="0" err="1"/>
+              <a:t>pvalue</a:t>
+            </a:r>
+            <a:r>
+              <a:rPr lang="en-US" dirty="0"/>
+              <a:t>=6.545578428438524e-28)</a:t>
+            </a:r>
+          </a:p>
+        </p:txBody>
+      </p:sp>
+    </p:spTree>
+    <p:extLst>
+      <p:ext uri="{BB962C8B-B14F-4D97-AF65-F5344CB8AC3E}">
+        <p14:creationId xmlns:p14="http://schemas.microsoft.com/office/powerpoint/2010/main" val="1408639230"/>
+      </p:ext>
+    </p:extLst>
+  </p:cSld>
+  <p:clrMapOvr>
+    <a:masterClrMapping/>
+  </p:clrMapOvr>
+</p:sld>
+</file>
+
+<file path=ppt/slides/slide16.xml><?xml version="1.0" encoding="utf-8"?>
+<p:sld xmlns:a="http://schemas.openxmlformats.org/drawingml/2006/main" xmlns:r="http://schemas.openxmlformats.org/officeDocument/2006/relationships" xmlns:p="http://schemas.openxmlformats.org/presentationml/2006/main">
+  <p:cSld>
+    <p:spTree>
+      <p:nvGrpSpPr>
+        <p:cNvPr id="1" name=""/>
+        <p:cNvGrpSpPr/>
+        <p:nvPr/>
+      </p:nvGrpSpPr>
+      <p:grpSpPr>
+        <a:xfrm>
+          <a:off x="0" y="0"/>
+          <a:ext cx="0" cy="0"/>
+          <a:chOff x="0" y="0"/>
+          <a:chExt cx="0" cy="0"/>
+        </a:xfrm>
+      </p:grpSpPr>
+      <p:sp>
+        <p:nvSpPr>
+          <p:cNvPr id="5" name="Title 4">
+            <a:extLst>
+              <a:ext uri="{FF2B5EF4-FFF2-40B4-BE49-F238E27FC236}">
+                <a16:creationId xmlns:a16="http://schemas.microsoft.com/office/drawing/2014/main" id="{0A84CF99-998B-4D36-AE0A-6C66C12F3934}"/>
+              </a:ext>
+            </a:extLst>
+          </p:cNvPr>
+          <p:cNvSpPr>
+            <a:spLocks noGrp="1"/>
+          </p:cNvSpPr>
+          <p:nvPr>
+            <p:ph type="title"/>
+          </p:nvPr>
+        </p:nvSpPr>
+        <p:spPr/>
+        <p:txBody>
+          <a:bodyPr/>
+          <a:lstStyle/>
+          <a:p>
+            <a:r>
+              <a:rPr lang="en-US" dirty="0"/>
+              <a:t>Release Date</a:t>
+            </a:r>
+          </a:p>
+        </p:txBody>
+      </p:sp>
+      <p:pic>
+        <p:nvPicPr>
+          <p:cNvPr id="3" name="Picture 2" descr="A close up of a mans face&#10;&#10;Description automatically generated">
+            <a:extLst>
+              <a:ext uri="{FF2B5EF4-FFF2-40B4-BE49-F238E27FC236}">
+                <a16:creationId xmlns:a16="http://schemas.microsoft.com/office/drawing/2014/main" id="{93690A67-85F4-45DF-978A-3E884A1601D7}"/>
+              </a:ext>
+            </a:extLst>
+          </p:cNvPr>
+          <p:cNvPicPr>
+            <a:picLocks noChangeAspect="1"/>
+          </p:cNvPicPr>
+          <p:nvPr/>
+        </p:nvPicPr>
+        <p:blipFill>
+          <a:blip r:embed="rId2">
+            <a:extLst>
+              <a:ext uri="{28A0092B-C50C-407E-A947-70E740481C1C}">
+                <a14:useLocalDpi xmlns:a14="http://schemas.microsoft.com/office/drawing/2010/main" val="0"/>
+              </a:ext>
+            </a:extLst>
+          </a:blip>
+          <a:stretch>
+            <a:fillRect/>
+          </a:stretch>
+        </p:blipFill>
+        <p:spPr>
+          <a:xfrm>
+            <a:off x="2758269" y="1669357"/>
+            <a:ext cx="6664813" cy="4443208"/>
+          </a:xfrm>
+          <a:prstGeom prst="rect">
+            <a:avLst/>
+          </a:prstGeom>
+        </p:spPr>
+      </p:pic>
+    </p:spTree>
+    <p:extLst>
+      <p:ext uri="{BB962C8B-B14F-4D97-AF65-F5344CB8AC3E}">
+        <p14:creationId xmlns:p14="http://schemas.microsoft.com/office/powerpoint/2010/main" val="1089051251"/>
+      </p:ext>
+    </p:extLst>
+  </p:cSld>
+  <p:clrMapOvr>
+    <a:masterClrMapping/>
+  </p:clrMapOvr>
+</p:sld>
+</file>
+
+<file path=ppt/slides/slide17.xml><?xml version="1.0" encoding="utf-8"?>
+<p:sld xmlns:a="http://schemas.openxmlformats.org/drawingml/2006/main" xmlns:r="http://schemas.openxmlformats.org/officeDocument/2006/relationships" xmlns:p="http://schemas.openxmlformats.org/presentationml/2006/main">
+  <p:cSld>
+    <p:spTree>
+      <p:nvGrpSpPr>
+        <p:cNvPr id="1" name=""/>
+        <p:cNvGrpSpPr/>
+        <p:nvPr/>
+      </p:nvGrpSpPr>
+      <p:grpSpPr>
+        <a:xfrm>
+          <a:off x="0" y="0"/>
+          <a:ext cx="0" cy="0"/>
+          <a:chOff x="0" y="0"/>
+          <a:chExt cx="0" cy="0"/>
+        </a:xfrm>
+      </p:grpSpPr>
+      <p:sp>
+        <p:nvSpPr>
+          <p:cNvPr id="5" name="Title 4">
+            <a:extLst>
+              <a:ext uri="{FF2B5EF4-FFF2-40B4-BE49-F238E27FC236}">
+                <a16:creationId xmlns:a16="http://schemas.microsoft.com/office/drawing/2014/main" id="{0A84CF99-998B-4D36-AE0A-6C66C12F3934}"/>
+              </a:ext>
+            </a:extLst>
+          </p:cNvPr>
+          <p:cNvSpPr>
+            <a:spLocks noGrp="1"/>
+          </p:cNvSpPr>
+          <p:nvPr>
+            <p:ph type="title"/>
+          </p:nvPr>
+        </p:nvSpPr>
+        <p:spPr/>
+        <p:txBody>
+          <a:bodyPr/>
+          <a:lstStyle/>
+          <a:p>
+            <a:r>
+              <a:rPr lang="en-US" dirty="0"/>
+              <a:t>Release Date</a:t>
+            </a:r>
+          </a:p>
+        </p:txBody>
+      </p:sp>
+      <p:pic>
+        <p:nvPicPr>
+          <p:cNvPr id="4" name="Picture 3" descr="A screenshot of a cell phone screen with text&#10;&#10;Description automatically generated">
+            <a:extLst>
+              <a:ext uri="{FF2B5EF4-FFF2-40B4-BE49-F238E27FC236}">
+                <a16:creationId xmlns:a16="http://schemas.microsoft.com/office/drawing/2014/main" id="{0EFE4841-E927-46ED-B31E-5D8607100E65}"/>
+              </a:ext>
+            </a:extLst>
+          </p:cNvPr>
+          <p:cNvPicPr>
+            <a:picLocks noChangeAspect="1"/>
+          </p:cNvPicPr>
+          <p:nvPr/>
+        </p:nvPicPr>
+        <p:blipFill>
+          <a:blip r:embed="rId2">
+            <a:extLst>
+              <a:ext uri="{28A0092B-C50C-407E-A947-70E740481C1C}">
+                <a14:useLocalDpi xmlns:a14="http://schemas.microsoft.com/office/drawing/2010/main" val="0"/>
+              </a:ext>
+            </a:extLst>
+          </a:blip>
+          <a:stretch>
+            <a:fillRect/>
+          </a:stretch>
+        </p:blipFill>
+        <p:spPr>
+          <a:xfrm>
+            <a:off x="2499024" y="1580050"/>
+            <a:ext cx="7183303" cy="4788868"/>
+          </a:xfrm>
+          <a:prstGeom prst="rect">
+            <a:avLst/>
+          </a:prstGeom>
+        </p:spPr>
+      </p:pic>
+    </p:spTree>
+    <p:extLst>
+      <p:ext uri="{BB962C8B-B14F-4D97-AF65-F5344CB8AC3E}">
+        <p14:creationId xmlns:p14="http://schemas.microsoft.com/office/powerpoint/2010/main" val="531353509"/>
+      </p:ext>
+    </p:extLst>
+  </p:cSld>
+  <p:clrMapOvr>
+    <a:masterClrMapping/>
+  </p:clrMapOvr>
+</p:sld>
+</file>
+
+<file path=ppt/slides/slide18.xml><?xml version="1.0" encoding="utf-8"?>
+<p:sld xmlns:a="http://schemas.openxmlformats.org/drawingml/2006/main" xmlns:r="http://schemas.openxmlformats.org/officeDocument/2006/relationships" xmlns:p="http://schemas.openxmlformats.org/presentationml/2006/main">
+  <p:cSld>
+    <p:spTree>
+      <p:nvGrpSpPr>
+        <p:cNvPr id="1" name=""/>
+        <p:cNvGrpSpPr/>
+        <p:nvPr/>
+      </p:nvGrpSpPr>
+      <p:grpSpPr>
+        <a:xfrm>
+          <a:off x="0" y="0"/>
+          <a:ext cx="0" cy="0"/>
+          <a:chOff x="0" y="0"/>
+          <a:chExt cx="0" cy="0"/>
+        </a:xfrm>
+      </p:grpSpPr>
+      <p:sp>
+        <p:nvSpPr>
+          <p:cNvPr id="5" name="Title 4">
+            <a:extLst>
+              <a:ext uri="{FF2B5EF4-FFF2-40B4-BE49-F238E27FC236}">
+                <a16:creationId xmlns:a16="http://schemas.microsoft.com/office/drawing/2014/main" id="{0A84CF99-998B-4D36-AE0A-6C66C12F3934}"/>
+              </a:ext>
+            </a:extLst>
+          </p:cNvPr>
+          <p:cNvSpPr>
+            <a:spLocks noGrp="1"/>
+          </p:cNvSpPr>
+          <p:nvPr>
+            <p:ph type="title"/>
+          </p:nvPr>
+        </p:nvSpPr>
+        <p:spPr/>
+        <p:txBody>
+          <a:bodyPr/>
+          <a:lstStyle/>
+          <a:p>
+            <a:r>
+              <a:rPr lang="en-US" dirty="0"/>
+              <a:t>Release Date</a:t>
+            </a:r>
+          </a:p>
+        </p:txBody>
+      </p:sp>
+      <p:pic>
+        <p:nvPicPr>
+          <p:cNvPr id="3" name="Picture 2" descr="A picture containing text&#10;&#10;Description automatically generated">
+            <a:extLst>
+              <a:ext uri="{FF2B5EF4-FFF2-40B4-BE49-F238E27FC236}">
+                <a16:creationId xmlns:a16="http://schemas.microsoft.com/office/drawing/2014/main" id="{27DCBFCC-E480-4114-8413-E53121B0ECD8}"/>
+              </a:ext>
+            </a:extLst>
+          </p:cNvPr>
+          <p:cNvPicPr>
+            <a:picLocks noChangeAspect="1"/>
+          </p:cNvPicPr>
+          <p:nvPr/>
+        </p:nvPicPr>
+        <p:blipFill>
+          <a:blip r:embed="rId2">
+            <a:extLst>
+              <a:ext uri="{28A0092B-C50C-407E-A947-70E740481C1C}">
+                <a14:useLocalDpi xmlns:a14="http://schemas.microsoft.com/office/drawing/2010/main" val="0"/>
+              </a:ext>
+            </a:extLst>
+          </a:blip>
+          <a:stretch>
+            <a:fillRect/>
+          </a:stretch>
+        </p:blipFill>
+        <p:spPr>
+          <a:xfrm>
+            <a:off x="2663020" y="1678192"/>
+            <a:ext cx="6855312" cy="4570208"/>
+          </a:xfrm>
+          <a:prstGeom prst="rect">
+            <a:avLst/>
+          </a:prstGeom>
+        </p:spPr>
+      </p:pic>
+    </p:spTree>
+    <p:extLst>
+      <p:ext uri="{BB962C8B-B14F-4D97-AF65-F5344CB8AC3E}">
+        <p14:creationId xmlns:p14="http://schemas.microsoft.com/office/powerpoint/2010/main" val="2201793301"/>
+      </p:ext>
+    </p:extLst>
+  </p:cSld>
+  <p:clrMapOvr>
+    <a:masterClrMapping/>
+  </p:clrMapOvr>
+</p:sld>
+</file>
+
+<file path=ppt/slides/slide19.xml><?xml version="1.0" encoding="utf-8"?>
+<p:sld xmlns:a="http://schemas.openxmlformats.org/drawingml/2006/main" xmlns:r="http://schemas.openxmlformats.org/officeDocument/2006/relationships" xmlns:p="http://schemas.openxmlformats.org/presentationml/2006/main">
+  <p:cSld>
+    <p:spTree>
+      <p:nvGrpSpPr>
+        <p:cNvPr id="1" name=""/>
+        <p:cNvGrpSpPr/>
+        <p:nvPr/>
+      </p:nvGrpSpPr>
+      <p:grpSpPr>
+        <a:xfrm>
+          <a:off x="0" y="0"/>
+          <a:ext cx="0" cy="0"/>
+          <a:chOff x="0" y="0"/>
+          <a:chExt cx="0" cy="0"/>
+        </a:xfrm>
+      </p:grpSpPr>
+      <p:sp>
+        <p:nvSpPr>
+          <p:cNvPr id="5" name="Title 4">
+            <a:extLst>
+              <a:ext uri="{FF2B5EF4-FFF2-40B4-BE49-F238E27FC236}">
+                <a16:creationId xmlns:a16="http://schemas.microsoft.com/office/drawing/2014/main" id="{0A84CF99-998B-4D36-AE0A-6C66C12F3934}"/>
+              </a:ext>
+            </a:extLst>
+          </p:cNvPr>
+          <p:cNvSpPr>
+            <a:spLocks noGrp="1"/>
+          </p:cNvSpPr>
+          <p:nvPr>
+            <p:ph type="title"/>
+          </p:nvPr>
+        </p:nvSpPr>
+        <p:spPr/>
+        <p:txBody>
+          <a:bodyPr/>
+          <a:lstStyle/>
+          <a:p>
+            <a:r>
+              <a:rPr lang="en-US" dirty="0"/>
+              <a:t>Release Date</a:t>
+            </a:r>
+          </a:p>
+        </p:txBody>
+      </p:sp>
+      <p:pic>
+        <p:nvPicPr>
+          <p:cNvPr id="3" name="Picture 2" descr="A picture containing text&#10;&#10;Description automatically generated">
+            <a:extLst>
+              <a:ext uri="{FF2B5EF4-FFF2-40B4-BE49-F238E27FC236}">
+                <a16:creationId xmlns:a16="http://schemas.microsoft.com/office/drawing/2014/main" id="{27DCBFCC-E480-4114-8413-E53121B0ECD8}"/>
+              </a:ext>
+            </a:extLst>
+          </p:cNvPr>
+          <p:cNvPicPr>
+            <a:picLocks noChangeAspect="1"/>
+          </p:cNvPicPr>
+          <p:nvPr/>
+        </p:nvPicPr>
+        <p:blipFill>
+          <a:blip r:embed="rId2">
+            <a:extLst>
+              <a:ext uri="{28A0092B-C50C-407E-A947-70E740481C1C}">
+                <a14:useLocalDpi xmlns:a14="http://schemas.microsoft.com/office/drawing/2010/main" val="0"/>
+              </a:ext>
+            </a:extLst>
+          </a:blip>
+          <a:stretch>
+            <a:fillRect/>
+          </a:stretch>
+        </p:blipFill>
+        <p:spPr>
+          <a:xfrm>
+            <a:off x="2663020" y="1678192"/>
+            <a:ext cx="6855312" cy="4570208"/>
+          </a:xfrm>
+          <a:prstGeom prst="rect">
+            <a:avLst/>
+          </a:prstGeom>
+        </p:spPr>
+      </p:pic>
+    </p:spTree>
+    <p:extLst>
+      <p:ext uri="{BB962C8B-B14F-4D97-AF65-F5344CB8AC3E}">
+        <p14:creationId xmlns:p14="http://schemas.microsoft.com/office/powerpoint/2010/main" val="361528022"/>
+      </p:ext>
+    </p:extLst>
+  </p:cSld>
+  <p:clrMapOvr>
+    <a:masterClrMapping/>
+  </p:clrMapOvr>
+</p:sld>
+</file>
+
 <file path=ppt/slides/slide2.xml><?xml version="1.0" encoding="utf-8"?>
 <p:sld xmlns:a="http://schemas.openxmlformats.org/drawingml/2006/main" xmlns:r="http://schemas.openxmlformats.org/officeDocument/2006/relationships" xmlns:p="http://schemas.openxmlformats.org/presentationml/2006/main">
   <p:cSld>
@@ -7101,6 +8183,1243 @@
       </p:par>
     </p:tnLst>
   </p:timing>
+</p:sld>
+</file>
+
+<file path=ppt/slides/slide20.xml><?xml version="1.0" encoding="utf-8"?>
+<p:sld xmlns:a="http://schemas.openxmlformats.org/drawingml/2006/main" xmlns:r="http://schemas.openxmlformats.org/officeDocument/2006/relationships" xmlns:p="http://schemas.openxmlformats.org/presentationml/2006/main">
+  <p:cSld>
+    <p:spTree>
+      <p:nvGrpSpPr>
+        <p:cNvPr id="1" name=""/>
+        <p:cNvGrpSpPr/>
+        <p:nvPr/>
+      </p:nvGrpSpPr>
+      <p:grpSpPr>
+        <a:xfrm>
+          <a:off x="0" y="0"/>
+          <a:ext cx="0" cy="0"/>
+          <a:chOff x="0" y="0"/>
+          <a:chExt cx="0" cy="0"/>
+        </a:xfrm>
+      </p:grpSpPr>
+      <p:sp>
+        <p:nvSpPr>
+          <p:cNvPr id="5" name="Title 4">
+            <a:extLst>
+              <a:ext uri="{FF2B5EF4-FFF2-40B4-BE49-F238E27FC236}">
+                <a16:creationId xmlns:a16="http://schemas.microsoft.com/office/drawing/2014/main" id="{0A84CF99-998B-4D36-AE0A-6C66C12F3934}"/>
+              </a:ext>
+            </a:extLst>
+          </p:cNvPr>
+          <p:cNvSpPr>
+            <a:spLocks noGrp="1"/>
+          </p:cNvSpPr>
+          <p:nvPr>
+            <p:ph type="title"/>
+          </p:nvPr>
+        </p:nvSpPr>
+        <p:spPr/>
+        <p:txBody>
+          <a:bodyPr/>
+          <a:lstStyle/>
+          <a:p>
+            <a:r>
+              <a:rPr lang="en-US" dirty="0"/>
+              <a:t>Release Date</a:t>
+            </a:r>
+          </a:p>
+        </p:txBody>
+      </p:sp>
+      <p:pic>
+        <p:nvPicPr>
+          <p:cNvPr id="4" name="Picture 3" descr="A picture containing text, businesscard&#10;&#10;Description automatically generated">
+            <a:extLst>
+              <a:ext uri="{FF2B5EF4-FFF2-40B4-BE49-F238E27FC236}">
+                <a16:creationId xmlns:a16="http://schemas.microsoft.com/office/drawing/2014/main" id="{4BA1498C-B7E3-49E7-B9B7-843E3881DABC}"/>
+              </a:ext>
+            </a:extLst>
+          </p:cNvPr>
+          <p:cNvPicPr>
+            <a:picLocks noChangeAspect="1"/>
+          </p:cNvPicPr>
+          <p:nvPr/>
+        </p:nvPicPr>
+        <p:blipFill>
+          <a:blip r:embed="rId2">
+            <a:extLst>
+              <a:ext uri="{28A0092B-C50C-407E-A947-70E740481C1C}">
+                <a14:useLocalDpi xmlns:a14="http://schemas.microsoft.com/office/drawing/2010/main" val="0"/>
+              </a:ext>
+            </a:extLst>
+          </a:blip>
+          <a:stretch>
+            <a:fillRect/>
+          </a:stretch>
+        </p:blipFill>
+        <p:spPr>
+          <a:xfrm>
+            <a:off x="2622273" y="1679296"/>
+            <a:ext cx="6724448" cy="4482965"/>
+          </a:xfrm>
+          <a:prstGeom prst="rect">
+            <a:avLst/>
+          </a:prstGeom>
+        </p:spPr>
+      </p:pic>
+    </p:spTree>
+    <p:extLst>
+      <p:ext uri="{BB962C8B-B14F-4D97-AF65-F5344CB8AC3E}">
+        <p14:creationId xmlns:p14="http://schemas.microsoft.com/office/powerpoint/2010/main" val="665231892"/>
+      </p:ext>
+    </p:extLst>
+  </p:cSld>
+  <p:clrMapOvr>
+    <a:masterClrMapping/>
+  </p:clrMapOvr>
+</p:sld>
+</file>
+
+<file path=ppt/slides/slide21.xml><?xml version="1.0" encoding="utf-8"?>
+<p:sld xmlns:a="http://schemas.openxmlformats.org/drawingml/2006/main" xmlns:r="http://schemas.openxmlformats.org/officeDocument/2006/relationships" xmlns:p="http://schemas.openxmlformats.org/presentationml/2006/main">
+  <p:cSld>
+    <p:spTree>
+      <p:nvGrpSpPr>
+        <p:cNvPr id="1" name=""/>
+        <p:cNvGrpSpPr/>
+        <p:nvPr/>
+      </p:nvGrpSpPr>
+      <p:grpSpPr>
+        <a:xfrm>
+          <a:off x="0" y="0"/>
+          <a:ext cx="0" cy="0"/>
+          <a:chOff x="0" y="0"/>
+          <a:chExt cx="0" cy="0"/>
+        </a:xfrm>
+      </p:grpSpPr>
+      <p:sp>
+        <p:nvSpPr>
+          <p:cNvPr id="5" name="Title 4">
+            <a:extLst>
+              <a:ext uri="{FF2B5EF4-FFF2-40B4-BE49-F238E27FC236}">
+                <a16:creationId xmlns:a16="http://schemas.microsoft.com/office/drawing/2014/main" id="{0A84CF99-998B-4D36-AE0A-6C66C12F3934}"/>
+              </a:ext>
+            </a:extLst>
+          </p:cNvPr>
+          <p:cNvSpPr>
+            <a:spLocks noGrp="1"/>
+          </p:cNvSpPr>
+          <p:nvPr>
+            <p:ph type="title"/>
+          </p:nvPr>
+        </p:nvSpPr>
+        <p:spPr/>
+        <p:txBody>
+          <a:bodyPr/>
+          <a:lstStyle/>
+          <a:p>
+            <a:r>
+              <a:rPr lang="en-US" dirty="0"/>
+              <a:t>Release Date</a:t>
+            </a:r>
+          </a:p>
+        </p:txBody>
+      </p:sp>
+      <p:pic>
+        <p:nvPicPr>
+          <p:cNvPr id="4" name="Picture 3" descr="A picture containing text, businesscard&#10;&#10;Description automatically generated">
+            <a:extLst>
+              <a:ext uri="{FF2B5EF4-FFF2-40B4-BE49-F238E27FC236}">
+                <a16:creationId xmlns:a16="http://schemas.microsoft.com/office/drawing/2014/main" id="{4BA1498C-B7E3-49E7-B9B7-843E3881DABC}"/>
+              </a:ext>
+            </a:extLst>
+          </p:cNvPr>
+          <p:cNvPicPr>
+            <a:picLocks noChangeAspect="1"/>
+          </p:cNvPicPr>
+          <p:nvPr/>
+        </p:nvPicPr>
+        <p:blipFill>
+          <a:blip r:embed="rId2">
+            <a:extLst>
+              <a:ext uri="{28A0092B-C50C-407E-A947-70E740481C1C}">
+                <a14:useLocalDpi xmlns:a14="http://schemas.microsoft.com/office/drawing/2010/main" val="0"/>
+              </a:ext>
+            </a:extLst>
+          </a:blip>
+          <a:stretch>
+            <a:fillRect/>
+          </a:stretch>
+        </p:blipFill>
+        <p:spPr>
+          <a:xfrm>
+            <a:off x="2622273" y="1679296"/>
+            <a:ext cx="6724448" cy="4482965"/>
+          </a:xfrm>
+          <a:prstGeom prst="rect">
+            <a:avLst/>
+          </a:prstGeom>
+        </p:spPr>
+      </p:pic>
+    </p:spTree>
+    <p:extLst>
+      <p:ext uri="{BB962C8B-B14F-4D97-AF65-F5344CB8AC3E}">
+        <p14:creationId xmlns:p14="http://schemas.microsoft.com/office/powerpoint/2010/main" val="145853249"/>
+      </p:ext>
+    </p:extLst>
+  </p:cSld>
+  <p:clrMapOvr>
+    <a:masterClrMapping/>
+  </p:clrMapOvr>
+</p:sld>
+</file>
+
+<file path=ppt/slides/slide22.xml><?xml version="1.0" encoding="utf-8"?>
+<p:sld xmlns:a="http://schemas.openxmlformats.org/drawingml/2006/main" xmlns:r="http://schemas.openxmlformats.org/officeDocument/2006/relationships" xmlns:p="http://schemas.openxmlformats.org/presentationml/2006/main">
+  <p:cSld>
+    <p:spTree>
+      <p:nvGrpSpPr>
+        <p:cNvPr id="1" name=""/>
+        <p:cNvGrpSpPr/>
+        <p:nvPr/>
+      </p:nvGrpSpPr>
+      <p:grpSpPr>
+        <a:xfrm>
+          <a:off x="0" y="0"/>
+          <a:ext cx="0" cy="0"/>
+          <a:chOff x="0" y="0"/>
+          <a:chExt cx="0" cy="0"/>
+        </a:xfrm>
+      </p:grpSpPr>
+      <p:sp>
+        <p:nvSpPr>
+          <p:cNvPr id="5" name="Title 4">
+            <a:extLst>
+              <a:ext uri="{FF2B5EF4-FFF2-40B4-BE49-F238E27FC236}">
+                <a16:creationId xmlns:a16="http://schemas.microsoft.com/office/drawing/2014/main" id="{0A84CF99-998B-4D36-AE0A-6C66C12F3934}"/>
+              </a:ext>
+            </a:extLst>
+          </p:cNvPr>
+          <p:cNvSpPr>
+            <a:spLocks noGrp="1"/>
+          </p:cNvSpPr>
+          <p:nvPr>
+            <p:ph type="title"/>
+          </p:nvPr>
+        </p:nvSpPr>
+        <p:spPr/>
+        <p:txBody>
+          <a:bodyPr/>
+          <a:lstStyle/>
+          <a:p>
+            <a:r>
+              <a:rPr lang="en-US" dirty="0"/>
+              <a:t>Release Date</a:t>
+            </a:r>
+          </a:p>
+        </p:txBody>
+      </p:sp>
+      <p:pic>
+        <p:nvPicPr>
+          <p:cNvPr id="3" name="Picture 2">
+            <a:extLst>
+              <a:ext uri="{FF2B5EF4-FFF2-40B4-BE49-F238E27FC236}">
+                <a16:creationId xmlns:a16="http://schemas.microsoft.com/office/drawing/2014/main" id="{E67D3267-84F0-4E8B-8B48-9A35E251C342}"/>
+              </a:ext>
+            </a:extLst>
+          </p:cNvPr>
+          <p:cNvPicPr>
+            <a:picLocks noChangeAspect="1"/>
+          </p:cNvPicPr>
+          <p:nvPr/>
+        </p:nvPicPr>
+        <p:blipFill>
+          <a:blip r:embed="rId2">
+            <a:extLst>
+              <a:ext uri="{28A0092B-C50C-407E-A947-70E740481C1C}">
+                <a14:useLocalDpi xmlns:a14="http://schemas.microsoft.com/office/drawing/2010/main" val="0"/>
+              </a:ext>
+            </a:extLst>
+          </a:blip>
+          <a:stretch>
+            <a:fillRect/>
+          </a:stretch>
+        </p:blipFill>
+        <p:spPr>
+          <a:xfrm>
+            <a:off x="1540211" y="1449455"/>
+            <a:ext cx="9100930" cy="4550465"/>
+          </a:xfrm>
+          <a:prstGeom prst="rect">
+            <a:avLst/>
+          </a:prstGeom>
+        </p:spPr>
+      </p:pic>
+      <p:sp>
+        <p:nvSpPr>
+          <p:cNvPr id="7" name="Rectangle 6">
+            <a:extLst>
+              <a:ext uri="{FF2B5EF4-FFF2-40B4-BE49-F238E27FC236}">
+                <a16:creationId xmlns:a16="http://schemas.microsoft.com/office/drawing/2014/main" id="{C5C825F3-68FA-4E82-A741-F91EBA35BFF7}"/>
+              </a:ext>
+            </a:extLst>
+          </p:cNvPr>
+          <p:cNvSpPr/>
+          <p:nvPr/>
+        </p:nvSpPr>
+        <p:spPr>
+          <a:xfrm>
+            <a:off x="2014330" y="6137270"/>
+            <a:ext cx="9942443" cy="369332"/>
+          </a:xfrm>
+          <a:prstGeom prst="rect">
+            <a:avLst/>
+          </a:prstGeom>
+        </p:spPr>
+        <p:txBody>
+          <a:bodyPr wrap="square">
+            <a:spAutoFit/>
+          </a:bodyPr>
+          <a:lstStyle/>
+          <a:p>
+            <a:r>
+              <a:rPr lang="en-US" dirty="0" err="1"/>
+              <a:t>F_onewayResult</a:t>
+            </a:r>
+            <a:r>
+              <a:rPr lang="en-US" dirty="0"/>
+              <a:t>(statistic=10.874730742925472, </a:t>
+            </a:r>
+            <a:r>
+              <a:rPr lang="en-US" dirty="0" err="1"/>
+              <a:t>pvalue</a:t>
+            </a:r>
+            <a:r>
+              <a:rPr lang="en-US" dirty="0"/>
+              <a:t>=3.6178800066850965e-19)</a:t>
+            </a:r>
+          </a:p>
+        </p:txBody>
+      </p:sp>
+    </p:spTree>
+    <p:extLst>
+      <p:ext uri="{BB962C8B-B14F-4D97-AF65-F5344CB8AC3E}">
+        <p14:creationId xmlns:p14="http://schemas.microsoft.com/office/powerpoint/2010/main" val="123799690"/>
+      </p:ext>
+    </p:extLst>
+  </p:cSld>
+  <p:clrMapOvr>
+    <a:masterClrMapping/>
+  </p:clrMapOvr>
+</p:sld>
+</file>
+
+<file path=ppt/slides/slide23.xml><?xml version="1.0" encoding="utf-8"?>
+<p:sld xmlns:a="http://schemas.openxmlformats.org/drawingml/2006/main" xmlns:r="http://schemas.openxmlformats.org/officeDocument/2006/relationships" xmlns:p="http://schemas.openxmlformats.org/presentationml/2006/main">
+  <p:cSld>
+    <p:spTree>
+      <p:nvGrpSpPr>
+        <p:cNvPr id="1" name=""/>
+        <p:cNvGrpSpPr/>
+        <p:nvPr/>
+      </p:nvGrpSpPr>
+      <p:grpSpPr>
+        <a:xfrm>
+          <a:off x="0" y="0"/>
+          <a:ext cx="0" cy="0"/>
+          <a:chOff x="0" y="0"/>
+          <a:chExt cx="0" cy="0"/>
+        </a:xfrm>
+      </p:grpSpPr>
+      <p:sp>
+        <p:nvSpPr>
+          <p:cNvPr id="5" name="Title 4">
+            <a:extLst>
+              <a:ext uri="{FF2B5EF4-FFF2-40B4-BE49-F238E27FC236}">
+                <a16:creationId xmlns:a16="http://schemas.microsoft.com/office/drawing/2014/main" id="{0A84CF99-998B-4D36-AE0A-6C66C12F3934}"/>
+              </a:ext>
+            </a:extLst>
+          </p:cNvPr>
+          <p:cNvSpPr>
+            <a:spLocks noGrp="1"/>
+          </p:cNvSpPr>
+          <p:nvPr>
+            <p:ph type="title"/>
+          </p:nvPr>
+        </p:nvSpPr>
+        <p:spPr/>
+        <p:txBody>
+          <a:bodyPr/>
+          <a:lstStyle/>
+          <a:p>
+            <a:r>
+              <a:rPr lang="en-US" dirty="0"/>
+              <a:t>Runtime</a:t>
+            </a:r>
+          </a:p>
+        </p:txBody>
+      </p:sp>
+      <p:pic>
+        <p:nvPicPr>
+          <p:cNvPr id="4" name="Picture 3" descr="A screenshot of a cell phone&#10;&#10;Description automatically generated">
+            <a:extLst>
+              <a:ext uri="{FF2B5EF4-FFF2-40B4-BE49-F238E27FC236}">
+                <a16:creationId xmlns:a16="http://schemas.microsoft.com/office/drawing/2014/main" id="{FF496E90-602D-4AB4-A49E-D75FBF8E9217}"/>
+              </a:ext>
+            </a:extLst>
+          </p:cNvPr>
+          <p:cNvPicPr>
+            <a:picLocks noChangeAspect="1"/>
+          </p:cNvPicPr>
+          <p:nvPr/>
+        </p:nvPicPr>
+        <p:blipFill>
+          <a:blip r:embed="rId2">
+            <a:extLst>
+              <a:ext uri="{28A0092B-C50C-407E-A947-70E740481C1C}">
+                <a14:useLocalDpi xmlns:a14="http://schemas.microsoft.com/office/drawing/2010/main" val="0"/>
+              </a:ext>
+            </a:extLst>
+          </a:blip>
+          <a:stretch>
+            <a:fillRect/>
+          </a:stretch>
+        </p:blipFill>
+        <p:spPr>
+          <a:xfrm>
+            <a:off x="1517634" y="1480410"/>
+            <a:ext cx="9146084" cy="4573042"/>
+          </a:xfrm>
+          <a:prstGeom prst="rect">
+            <a:avLst/>
+          </a:prstGeom>
+        </p:spPr>
+      </p:pic>
+    </p:spTree>
+    <p:extLst>
+      <p:ext uri="{BB962C8B-B14F-4D97-AF65-F5344CB8AC3E}">
+        <p14:creationId xmlns:p14="http://schemas.microsoft.com/office/powerpoint/2010/main" val="3408017382"/>
+      </p:ext>
+    </p:extLst>
+  </p:cSld>
+  <p:clrMapOvr>
+    <a:masterClrMapping/>
+  </p:clrMapOvr>
+</p:sld>
+</file>
+
+<file path=ppt/slides/slide24.xml><?xml version="1.0" encoding="utf-8"?>
+<p:sld xmlns:a="http://schemas.openxmlformats.org/drawingml/2006/main" xmlns:r="http://schemas.openxmlformats.org/officeDocument/2006/relationships" xmlns:p="http://schemas.openxmlformats.org/presentationml/2006/main">
+  <p:cSld>
+    <p:spTree>
+      <p:nvGrpSpPr>
+        <p:cNvPr id="1" name=""/>
+        <p:cNvGrpSpPr/>
+        <p:nvPr/>
+      </p:nvGrpSpPr>
+      <p:grpSpPr>
+        <a:xfrm>
+          <a:off x="0" y="0"/>
+          <a:ext cx="0" cy="0"/>
+          <a:chOff x="0" y="0"/>
+          <a:chExt cx="0" cy="0"/>
+        </a:xfrm>
+      </p:grpSpPr>
+      <p:sp>
+        <p:nvSpPr>
+          <p:cNvPr id="5" name="Title 4">
+            <a:extLst>
+              <a:ext uri="{FF2B5EF4-FFF2-40B4-BE49-F238E27FC236}">
+                <a16:creationId xmlns:a16="http://schemas.microsoft.com/office/drawing/2014/main" id="{0A84CF99-998B-4D36-AE0A-6C66C12F3934}"/>
+              </a:ext>
+            </a:extLst>
+          </p:cNvPr>
+          <p:cNvSpPr>
+            <a:spLocks noGrp="1"/>
+          </p:cNvSpPr>
+          <p:nvPr>
+            <p:ph type="title"/>
+          </p:nvPr>
+        </p:nvSpPr>
+        <p:spPr/>
+        <p:txBody>
+          <a:bodyPr/>
+          <a:lstStyle/>
+          <a:p>
+            <a:r>
+              <a:rPr lang="en-US" dirty="0"/>
+              <a:t>Runtime</a:t>
+            </a:r>
+          </a:p>
+        </p:txBody>
+      </p:sp>
+      <p:pic>
+        <p:nvPicPr>
+          <p:cNvPr id="6" name="Picture 5">
+            <a:extLst>
+              <a:ext uri="{FF2B5EF4-FFF2-40B4-BE49-F238E27FC236}">
+                <a16:creationId xmlns:a16="http://schemas.microsoft.com/office/drawing/2014/main" id="{37050353-C27E-497E-92F4-84C3F7FE49E0}"/>
+              </a:ext>
+            </a:extLst>
+          </p:cNvPr>
+          <p:cNvPicPr>
+            <a:picLocks noChangeAspect="1"/>
+          </p:cNvPicPr>
+          <p:nvPr/>
+        </p:nvPicPr>
+        <p:blipFill>
+          <a:blip r:embed="rId2"/>
+          <a:stretch>
+            <a:fillRect/>
+          </a:stretch>
+        </p:blipFill>
+        <p:spPr>
+          <a:xfrm>
+            <a:off x="1433622" y="1422843"/>
+            <a:ext cx="9324756" cy="5180419"/>
+          </a:xfrm>
+          <a:prstGeom prst="rect">
+            <a:avLst/>
+          </a:prstGeom>
+        </p:spPr>
+      </p:pic>
+    </p:spTree>
+    <p:extLst>
+      <p:ext uri="{BB962C8B-B14F-4D97-AF65-F5344CB8AC3E}">
+        <p14:creationId xmlns:p14="http://schemas.microsoft.com/office/powerpoint/2010/main" val="2715377458"/>
+      </p:ext>
+    </p:extLst>
+  </p:cSld>
+  <p:clrMapOvr>
+    <a:masterClrMapping/>
+  </p:clrMapOvr>
+</p:sld>
+</file>
+
+<file path=ppt/slides/slide25.xml><?xml version="1.0" encoding="utf-8"?>
+<p:sld xmlns:a="http://schemas.openxmlformats.org/drawingml/2006/main" xmlns:r="http://schemas.openxmlformats.org/officeDocument/2006/relationships" xmlns:p="http://schemas.openxmlformats.org/presentationml/2006/main">
+  <p:cSld>
+    <p:spTree>
+      <p:nvGrpSpPr>
+        <p:cNvPr id="1" name=""/>
+        <p:cNvGrpSpPr/>
+        <p:nvPr/>
+      </p:nvGrpSpPr>
+      <p:grpSpPr>
+        <a:xfrm>
+          <a:off x="0" y="0"/>
+          <a:ext cx="0" cy="0"/>
+          <a:chOff x="0" y="0"/>
+          <a:chExt cx="0" cy="0"/>
+        </a:xfrm>
+      </p:grpSpPr>
+      <p:sp>
+        <p:nvSpPr>
+          <p:cNvPr id="5" name="Title 4">
+            <a:extLst>
+              <a:ext uri="{FF2B5EF4-FFF2-40B4-BE49-F238E27FC236}">
+                <a16:creationId xmlns:a16="http://schemas.microsoft.com/office/drawing/2014/main" id="{0A84CF99-998B-4D36-AE0A-6C66C12F3934}"/>
+              </a:ext>
+            </a:extLst>
+          </p:cNvPr>
+          <p:cNvSpPr>
+            <a:spLocks noGrp="1"/>
+          </p:cNvSpPr>
+          <p:nvPr>
+            <p:ph type="title"/>
+          </p:nvPr>
+        </p:nvSpPr>
+        <p:spPr/>
+        <p:txBody>
+          <a:bodyPr/>
+          <a:lstStyle/>
+          <a:p>
+            <a:r>
+              <a:rPr lang="en-US" dirty="0"/>
+              <a:t>Runtime</a:t>
+            </a:r>
+          </a:p>
+        </p:txBody>
+      </p:sp>
+      <p:pic>
+        <p:nvPicPr>
+          <p:cNvPr id="3" name="Picture 2" descr="A screenshot of a cell phone&#10;&#10;Description automatically generated">
+            <a:extLst>
+              <a:ext uri="{FF2B5EF4-FFF2-40B4-BE49-F238E27FC236}">
+                <a16:creationId xmlns:a16="http://schemas.microsoft.com/office/drawing/2014/main" id="{E96666FF-4EF1-4F1A-B3D3-C83E31274F41}"/>
+              </a:ext>
+            </a:extLst>
+          </p:cNvPr>
+          <p:cNvPicPr>
+            <a:picLocks noChangeAspect="1"/>
+          </p:cNvPicPr>
+          <p:nvPr/>
+        </p:nvPicPr>
+        <p:blipFill>
+          <a:blip r:embed="rId2">
+            <a:extLst>
+              <a:ext uri="{28A0092B-C50C-407E-A947-70E740481C1C}">
+                <a14:useLocalDpi xmlns:a14="http://schemas.microsoft.com/office/drawing/2010/main" val="0"/>
+              </a:ext>
+            </a:extLst>
+          </a:blip>
+          <a:stretch>
+            <a:fillRect/>
+          </a:stretch>
+        </p:blipFill>
+        <p:spPr>
+          <a:xfrm>
+            <a:off x="1517634" y="1675358"/>
+            <a:ext cx="9146084" cy="4573042"/>
+          </a:xfrm>
+          <a:prstGeom prst="rect">
+            <a:avLst/>
+          </a:prstGeom>
+        </p:spPr>
+      </p:pic>
+    </p:spTree>
+    <p:extLst>
+      <p:ext uri="{BB962C8B-B14F-4D97-AF65-F5344CB8AC3E}">
+        <p14:creationId xmlns:p14="http://schemas.microsoft.com/office/powerpoint/2010/main" val="3811578188"/>
+      </p:ext>
+    </p:extLst>
+  </p:cSld>
+  <p:clrMapOvr>
+    <a:masterClrMapping/>
+  </p:clrMapOvr>
+</p:sld>
+</file>
+
+<file path=ppt/slides/slide26.xml><?xml version="1.0" encoding="utf-8"?>
+<p:sld xmlns:a="http://schemas.openxmlformats.org/drawingml/2006/main" xmlns:r="http://schemas.openxmlformats.org/officeDocument/2006/relationships" xmlns:p="http://schemas.openxmlformats.org/presentationml/2006/main">
+  <p:cSld>
+    <p:spTree>
+      <p:nvGrpSpPr>
+        <p:cNvPr id="1" name=""/>
+        <p:cNvGrpSpPr/>
+        <p:nvPr/>
+      </p:nvGrpSpPr>
+      <p:grpSpPr>
+        <a:xfrm>
+          <a:off x="0" y="0"/>
+          <a:ext cx="0" cy="0"/>
+          <a:chOff x="0" y="0"/>
+          <a:chExt cx="0" cy="0"/>
+        </a:xfrm>
+      </p:grpSpPr>
+      <p:sp>
+        <p:nvSpPr>
+          <p:cNvPr id="2" name="Title 1">
+            <a:extLst>
+              <a:ext uri="{FF2B5EF4-FFF2-40B4-BE49-F238E27FC236}">
+                <a16:creationId xmlns:a16="http://schemas.microsoft.com/office/drawing/2014/main" id="{BD4B3D39-2E2E-4FEC-ADE3-925AB11B990C}"/>
+              </a:ext>
+            </a:extLst>
+          </p:cNvPr>
+          <p:cNvSpPr>
+            <a:spLocks noGrp="1"/>
+          </p:cNvSpPr>
+          <p:nvPr>
+            <p:ph type="title"/>
+          </p:nvPr>
+        </p:nvSpPr>
+        <p:spPr/>
+        <p:txBody>
+          <a:bodyPr/>
+          <a:lstStyle/>
+          <a:p>
+            <a:r>
+              <a:rPr lang="en-US" dirty="0"/>
+              <a:t>Interesting Findings</a:t>
+            </a:r>
+          </a:p>
+        </p:txBody>
+      </p:sp>
+      <p:sp>
+        <p:nvSpPr>
+          <p:cNvPr id="3" name="TextBox 2">
+            <a:extLst>
+              <a:ext uri="{FF2B5EF4-FFF2-40B4-BE49-F238E27FC236}">
+                <a16:creationId xmlns:a16="http://schemas.microsoft.com/office/drawing/2014/main" id="{2E1CDD25-C2AE-4E87-BFCB-D724370ECCBF}"/>
+              </a:ext>
+            </a:extLst>
+          </p:cNvPr>
+          <p:cNvSpPr txBox="1"/>
+          <p:nvPr/>
+        </p:nvSpPr>
+        <p:spPr>
+          <a:xfrm>
+            <a:off x="733427" y="1628776"/>
+            <a:ext cx="10948986" cy="4832092"/>
+          </a:xfrm>
+          <a:prstGeom prst="rect">
+            <a:avLst/>
+          </a:prstGeom>
+          <a:noFill/>
+        </p:spPr>
+        <p:txBody>
+          <a:bodyPr wrap="square" rtlCol="0">
+            <a:spAutoFit/>
+          </a:bodyPr>
+          <a:lstStyle/>
+          <a:p>
+            <a:r>
+              <a:rPr lang="en-US" sz="1600" dirty="0">
+                <a:ln>
+                  <a:solidFill>
+                    <a:schemeClr val="bg1">
+                      <a:lumMod val="75000"/>
+                      <a:lumOff val="25000"/>
+                      <a:alpha val="10000"/>
+                    </a:schemeClr>
+                  </a:solidFill>
+                </a:ln>
+                <a:solidFill>
+                  <a:schemeClr val="tx2"/>
+                </a:solidFill>
+                <a:effectLst>
+                  <a:outerShdw blurRad="9525" dist="25400" dir="14640000" algn="tl" rotWithShape="0">
+                    <a:schemeClr val="bg1">
+                      <a:alpha val="30000"/>
+                    </a:schemeClr>
+                  </a:outerShdw>
+                </a:effectLst>
+                <a:latin typeface="+mj-lt"/>
+                <a:ea typeface="+mj-ea"/>
+              </a:rPr>
+              <a:t>Based on our intuition and the wider distribution, we expected that critic’s ratings would have been the better determinate of box office results but it was actually the user ratings</a:t>
+            </a:r>
+          </a:p>
+          <a:p>
+            <a:endParaRPr lang="en-US" sz="1600" dirty="0">
+              <a:ln>
+                <a:solidFill>
+                  <a:schemeClr val="bg1">
+                    <a:lumMod val="75000"/>
+                    <a:lumOff val="25000"/>
+                    <a:alpha val="10000"/>
+                  </a:schemeClr>
+                </a:solidFill>
+              </a:ln>
+              <a:solidFill>
+                <a:schemeClr val="tx2"/>
+              </a:solidFill>
+              <a:effectLst>
+                <a:outerShdw blurRad="9525" dist="25400" dir="14640000" algn="tl" rotWithShape="0">
+                  <a:schemeClr val="bg1">
+                    <a:alpha val="30000"/>
+                  </a:schemeClr>
+                </a:outerShdw>
+              </a:effectLst>
+              <a:latin typeface="+mj-lt"/>
+              <a:ea typeface="+mj-ea"/>
+            </a:endParaRPr>
+          </a:p>
+          <a:p>
+            <a:r>
+              <a:rPr lang="en-US" sz="1600" dirty="0">
+                <a:ln>
+                  <a:solidFill>
+                    <a:schemeClr val="bg1">
+                      <a:lumMod val="75000"/>
+                      <a:lumOff val="25000"/>
+                      <a:alpha val="10000"/>
+                    </a:schemeClr>
+                  </a:solidFill>
+                </a:ln>
+                <a:solidFill>
+                  <a:schemeClr val="tx2"/>
+                </a:solidFill>
+                <a:effectLst>
+                  <a:outerShdw blurRad="9525" dist="25400" dir="14640000" algn="tl" rotWithShape="0">
+                    <a:schemeClr val="bg1">
+                      <a:alpha val="30000"/>
+                    </a:schemeClr>
+                  </a:outerShdw>
+                </a:effectLst>
+                <a:latin typeface="+mj-lt"/>
+                <a:ea typeface="+mj-ea"/>
+              </a:rPr>
+              <a:t>When looking at the top genres with box office success, most of the genres had a gradual increase in average revenue over the years. However, the genre with the most box office revenue had inconsistencies, with some years being drastically better than other years.</a:t>
+            </a:r>
+          </a:p>
+          <a:p>
+            <a:endParaRPr lang="en-US" sz="1600" dirty="0">
+              <a:ln>
+                <a:solidFill>
+                  <a:schemeClr val="bg1">
+                    <a:lumMod val="75000"/>
+                    <a:lumOff val="25000"/>
+                    <a:alpha val="10000"/>
+                  </a:schemeClr>
+                </a:solidFill>
+              </a:ln>
+              <a:solidFill>
+                <a:schemeClr val="tx2"/>
+              </a:solidFill>
+              <a:effectLst>
+                <a:outerShdw blurRad="9525" dist="25400" dir="14640000" algn="tl" rotWithShape="0">
+                  <a:schemeClr val="bg1">
+                    <a:alpha val="30000"/>
+                  </a:schemeClr>
+                </a:outerShdw>
+              </a:effectLst>
+              <a:latin typeface="+mj-lt"/>
+              <a:ea typeface="+mj-ea"/>
+            </a:endParaRPr>
+          </a:p>
+          <a:p>
+            <a:r>
+              <a:rPr lang="en-US" sz="1600" dirty="0">
+                <a:ln>
+                  <a:solidFill>
+                    <a:schemeClr val="bg1">
+                      <a:lumMod val="75000"/>
+                      <a:lumOff val="25000"/>
+                      <a:alpha val="10000"/>
+                    </a:schemeClr>
+                  </a:solidFill>
+                </a:ln>
+                <a:solidFill>
+                  <a:schemeClr val="tx2"/>
+                </a:solidFill>
+                <a:effectLst>
+                  <a:outerShdw blurRad="9525" dist="25400" dir="14640000" algn="tl" rotWithShape="0">
+                    <a:schemeClr val="bg1">
+                      <a:alpha val="30000"/>
+                    </a:schemeClr>
+                  </a:outerShdw>
+                </a:effectLst>
+                <a:latin typeface="+mj-lt"/>
+                <a:ea typeface="+mj-ea"/>
+              </a:rPr>
+              <a:t>We also expected PG-13 movies to be the most profitable on average because of the number of releases. However, due to the number of flops PG-13 movies produce, it makes sense that G movies show the biggest average earnings.</a:t>
+            </a:r>
+          </a:p>
+          <a:p>
+            <a:endParaRPr lang="en-US" sz="1600" dirty="0">
+              <a:ln>
+                <a:solidFill>
+                  <a:schemeClr val="bg1">
+                    <a:lumMod val="75000"/>
+                    <a:lumOff val="25000"/>
+                    <a:alpha val="10000"/>
+                  </a:schemeClr>
+                </a:solidFill>
+              </a:ln>
+              <a:solidFill>
+                <a:schemeClr val="tx2"/>
+              </a:solidFill>
+              <a:effectLst>
+                <a:outerShdw blurRad="9525" dist="25400" dir="14640000" algn="tl" rotWithShape="0">
+                  <a:schemeClr val="bg1">
+                    <a:alpha val="30000"/>
+                  </a:schemeClr>
+                </a:outerShdw>
+              </a:effectLst>
+              <a:latin typeface="+mj-lt"/>
+              <a:ea typeface="+mj-ea"/>
+            </a:endParaRPr>
+          </a:p>
+          <a:p>
+            <a:r>
+              <a:rPr lang="en-US" sz="1600" dirty="0">
+                <a:ln>
+                  <a:solidFill>
+                    <a:schemeClr val="bg1">
+                      <a:lumMod val="75000"/>
+                      <a:lumOff val="25000"/>
+                      <a:alpha val="10000"/>
+                    </a:schemeClr>
+                  </a:solidFill>
+                </a:ln>
+                <a:solidFill>
+                  <a:schemeClr val="tx2"/>
+                </a:solidFill>
+                <a:effectLst>
+                  <a:outerShdw blurRad="9525" dist="25400" dir="14640000" algn="tl" rotWithShape="0">
+                    <a:schemeClr val="bg1">
+                      <a:alpha val="30000"/>
+                    </a:schemeClr>
+                  </a:outerShdw>
+                </a:effectLst>
+                <a:latin typeface="+mj-lt"/>
+                <a:ea typeface="+mj-ea"/>
+              </a:rPr>
+              <a:t>While looking at monthly distribution of earnings, it was interesting to see earnings by quarter are roughly equal. By season or individual month, it is clear as to see which times of the year are most profitable.</a:t>
+            </a:r>
+          </a:p>
+          <a:p>
+            <a:endParaRPr lang="en-US" sz="1600" dirty="0">
+              <a:ln>
+                <a:solidFill>
+                  <a:schemeClr val="bg1">
+                    <a:lumMod val="75000"/>
+                    <a:lumOff val="25000"/>
+                    <a:alpha val="10000"/>
+                  </a:schemeClr>
+                </a:solidFill>
+              </a:ln>
+              <a:solidFill>
+                <a:schemeClr val="tx2"/>
+              </a:solidFill>
+              <a:effectLst>
+                <a:outerShdw blurRad="9525" dist="25400" dir="14640000" algn="tl" rotWithShape="0">
+                  <a:schemeClr val="bg1">
+                    <a:alpha val="30000"/>
+                  </a:schemeClr>
+                </a:outerShdw>
+              </a:effectLst>
+              <a:latin typeface="+mj-lt"/>
+              <a:ea typeface="+mj-ea"/>
+            </a:endParaRPr>
+          </a:p>
+          <a:p>
+            <a:r>
+              <a:rPr lang="en-US" sz="1600" dirty="0">
+                <a:ln>
+                  <a:solidFill>
+                    <a:schemeClr val="bg1">
+                      <a:lumMod val="75000"/>
+                      <a:lumOff val="25000"/>
+                      <a:alpha val="10000"/>
+                    </a:schemeClr>
+                  </a:solidFill>
+                </a:ln>
+                <a:solidFill>
+                  <a:schemeClr val="tx2"/>
+                </a:solidFill>
+                <a:effectLst>
+                  <a:outerShdw blurRad="9525" dist="25400" dir="14640000" algn="tl" rotWithShape="0">
+                    <a:schemeClr val="bg1">
+                      <a:alpha val="30000"/>
+                    </a:schemeClr>
+                  </a:outerShdw>
+                </a:effectLst>
+                <a:latin typeface="+mj-lt"/>
+                <a:ea typeface="+mj-ea"/>
+              </a:rPr>
+              <a:t>Was not expecting to find a relationship with runtime and box office results. The thought was if a movie was good, it did not matter how long the movie was.</a:t>
+            </a:r>
+          </a:p>
+          <a:p>
+            <a:endParaRPr lang="en-US" sz="1600" dirty="0">
+              <a:ln>
+                <a:solidFill>
+                  <a:schemeClr val="bg1">
+                    <a:lumMod val="75000"/>
+                    <a:lumOff val="25000"/>
+                    <a:alpha val="10000"/>
+                  </a:schemeClr>
+                </a:solidFill>
+              </a:ln>
+              <a:solidFill>
+                <a:schemeClr val="tx2"/>
+              </a:solidFill>
+              <a:effectLst>
+                <a:outerShdw blurRad="9525" dist="25400" dir="14640000" algn="tl" rotWithShape="0">
+                  <a:schemeClr val="bg1">
+                    <a:alpha val="30000"/>
+                  </a:schemeClr>
+                </a:outerShdw>
+              </a:effectLst>
+              <a:latin typeface="+mj-lt"/>
+              <a:ea typeface="+mj-ea"/>
+            </a:endParaRPr>
+          </a:p>
+          <a:p>
+            <a:r>
+              <a:rPr lang="en-US" sz="1600" dirty="0">
+                <a:ln>
+                  <a:solidFill>
+                    <a:schemeClr val="bg1">
+                      <a:lumMod val="75000"/>
+                      <a:lumOff val="25000"/>
+                      <a:alpha val="10000"/>
+                    </a:schemeClr>
+                  </a:solidFill>
+                </a:ln>
+                <a:solidFill>
+                  <a:schemeClr val="tx2"/>
+                </a:solidFill>
+                <a:effectLst>
+                  <a:outerShdw blurRad="9525" dist="25400" dir="14640000" algn="tl" rotWithShape="0">
+                    <a:schemeClr val="bg1">
+                      <a:alpha val="30000"/>
+                    </a:schemeClr>
+                  </a:outerShdw>
+                </a:effectLst>
+                <a:latin typeface="+mj-lt"/>
+                <a:ea typeface="+mj-ea"/>
+              </a:rPr>
+              <a:t>Given the data, an accurate assumption that can be made is that the majority of movies did not perform well and made less than $100 million at the box office.</a:t>
+            </a:r>
+          </a:p>
+          <a:p>
+            <a:endParaRPr lang="en-US" sz="2000" dirty="0">
+              <a:ln>
+                <a:solidFill>
+                  <a:schemeClr val="bg1">
+                    <a:lumMod val="75000"/>
+                    <a:lumOff val="25000"/>
+                    <a:alpha val="10000"/>
+                  </a:schemeClr>
+                </a:solidFill>
+              </a:ln>
+              <a:solidFill>
+                <a:schemeClr val="tx2"/>
+              </a:solidFill>
+              <a:effectLst>
+                <a:outerShdw blurRad="9525" dist="25400" dir="14640000" algn="tl" rotWithShape="0">
+                  <a:schemeClr val="bg1">
+                    <a:alpha val="30000"/>
+                  </a:schemeClr>
+                </a:outerShdw>
+              </a:effectLst>
+              <a:latin typeface="+mj-lt"/>
+              <a:ea typeface="+mj-ea"/>
+            </a:endParaRPr>
+          </a:p>
+        </p:txBody>
+      </p:sp>
+    </p:spTree>
+    <p:extLst>
+      <p:ext uri="{BB962C8B-B14F-4D97-AF65-F5344CB8AC3E}">
+        <p14:creationId xmlns:p14="http://schemas.microsoft.com/office/powerpoint/2010/main" val="3466785875"/>
+      </p:ext>
+    </p:extLst>
+  </p:cSld>
+  <p:clrMapOvr>
+    <a:masterClrMapping/>
+  </p:clrMapOvr>
+</p:sld>
+</file>
+
+<file path=ppt/slides/slide27.xml><?xml version="1.0" encoding="utf-8"?>
+<p:sld xmlns:a="http://schemas.openxmlformats.org/drawingml/2006/main" xmlns:r="http://schemas.openxmlformats.org/officeDocument/2006/relationships" xmlns:p="http://schemas.openxmlformats.org/presentationml/2006/main">
+  <p:cSld>
+    <p:spTree>
+      <p:nvGrpSpPr>
+        <p:cNvPr id="1" name=""/>
+        <p:cNvGrpSpPr/>
+        <p:nvPr/>
+      </p:nvGrpSpPr>
+      <p:grpSpPr>
+        <a:xfrm>
+          <a:off x="0" y="0"/>
+          <a:ext cx="0" cy="0"/>
+          <a:chOff x="0" y="0"/>
+          <a:chExt cx="0" cy="0"/>
+        </a:xfrm>
+      </p:grpSpPr>
+      <p:sp>
+        <p:nvSpPr>
+          <p:cNvPr id="3" name="Title 2">
+            <a:extLst>
+              <a:ext uri="{FF2B5EF4-FFF2-40B4-BE49-F238E27FC236}">
+                <a16:creationId xmlns:a16="http://schemas.microsoft.com/office/drawing/2014/main" id="{80704585-8A7A-400E-89F5-7A18806249B5}"/>
+              </a:ext>
+            </a:extLst>
+          </p:cNvPr>
+          <p:cNvSpPr>
+            <a:spLocks noGrp="1"/>
+          </p:cNvSpPr>
+          <p:nvPr>
+            <p:ph type="title"/>
+          </p:nvPr>
+        </p:nvSpPr>
+        <p:spPr/>
+        <p:txBody>
+          <a:bodyPr/>
+          <a:lstStyle/>
+          <a:p>
+            <a:r>
+              <a:rPr lang="en-US" dirty="0">
+                <a:effectLst/>
+              </a:rPr>
+              <a:t>Post Mortem</a:t>
+            </a:r>
+            <a:endParaRPr lang="en-US" dirty="0"/>
+          </a:p>
+        </p:txBody>
+      </p:sp>
+      <p:sp>
+        <p:nvSpPr>
+          <p:cNvPr id="4" name="TextBox 3">
+            <a:extLst>
+              <a:ext uri="{FF2B5EF4-FFF2-40B4-BE49-F238E27FC236}">
+                <a16:creationId xmlns:a16="http://schemas.microsoft.com/office/drawing/2014/main" id="{C7F18598-C141-4BF6-83B0-3D66F0ED9164}"/>
+              </a:ext>
+            </a:extLst>
+          </p:cNvPr>
+          <p:cNvSpPr txBox="1"/>
+          <p:nvPr/>
+        </p:nvSpPr>
+        <p:spPr>
+          <a:xfrm>
+            <a:off x="607162" y="1580050"/>
+            <a:ext cx="10460736" cy="3477875"/>
+          </a:xfrm>
+          <a:prstGeom prst="rect">
+            <a:avLst/>
+          </a:prstGeom>
+          <a:noFill/>
+        </p:spPr>
+        <p:txBody>
+          <a:bodyPr wrap="square" rtlCol="0">
+            <a:spAutoFit/>
+          </a:bodyPr>
+          <a:lstStyle/>
+          <a:p>
+            <a:r>
+              <a:rPr lang="en-US" sz="2000" dirty="0">
+                <a:ln>
+                  <a:solidFill>
+                    <a:schemeClr val="bg1">
+                      <a:lumMod val="75000"/>
+                      <a:lumOff val="25000"/>
+                      <a:alpha val="10000"/>
+                    </a:schemeClr>
+                  </a:solidFill>
+                </a:ln>
+                <a:solidFill>
+                  <a:schemeClr val="tx2"/>
+                </a:solidFill>
+                <a:latin typeface="+mj-lt"/>
+                <a:ea typeface="+mj-ea"/>
+              </a:rPr>
+              <a:t>We would have liked to perform a statistical analysis incorporating all the variables to see how they interact, but due deficiencies in time and expertise, we could not</a:t>
+            </a:r>
+          </a:p>
+          <a:p>
+            <a:endParaRPr lang="en-US" sz="2000" dirty="0">
+              <a:ln>
+                <a:solidFill>
+                  <a:schemeClr val="bg1">
+                    <a:lumMod val="75000"/>
+                    <a:lumOff val="25000"/>
+                    <a:alpha val="10000"/>
+                  </a:schemeClr>
+                </a:solidFill>
+              </a:ln>
+              <a:solidFill>
+                <a:schemeClr val="tx2"/>
+              </a:solidFill>
+              <a:latin typeface="+mj-lt"/>
+              <a:ea typeface="+mj-ea"/>
+            </a:endParaRPr>
+          </a:p>
+          <a:p>
+            <a:r>
+              <a:rPr lang="en-US" sz="2000" dirty="0">
+                <a:ln>
+                  <a:solidFill>
+                    <a:schemeClr val="bg1">
+                      <a:lumMod val="75000"/>
+                      <a:lumOff val="25000"/>
+                      <a:alpha val="10000"/>
+                    </a:schemeClr>
+                  </a:solidFill>
+                </a:ln>
+                <a:solidFill>
+                  <a:schemeClr val="tx2"/>
+                </a:solidFill>
+                <a:latin typeface="+mj-lt"/>
+                <a:ea typeface="+mj-ea"/>
+              </a:rPr>
+              <a:t>If there was more time to work, it would be interesting to compile a bigger list of movies to see if these trends are similar to trends in the past or if they have evolved over time.</a:t>
+            </a:r>
+          </a:p>
+          <a:p>
+            <a:endParaRPr lang="en-US" sz="2000" dirty="0">
+              <a:ln>
+                <a:solidFill>
+                  <a:schemeClr val="bg1">
+                    <a:lumMod val="75000"/>
+                    <a:lumOff val="25000"/>
+                    <a:alpha val="10000"/>
+                  </a:schemeClr>
+                </a:solidFill>
+              </a:ln>
+              <a:solidFill>
+                <a:schemeClr val="tx2"/>
+              </a:solidFill>
+              <a:latin typeface="+mj-lt"/>
+              <a:ea typeface="+mj-ea"/>
+            </a:endParaRPr>
+          </a:p>
+          <a:p>
+            <a:r>
+              <a:rPr lang="en-US" sz="2000" dirty="0">
+                <a:ln>
+                  <a:solidFill>
+                    <a:schemeClr val="bg1">
+                      <a:lumMod val="75000"/>
+                      <a:lumOff val="25000"/>
+                      <a:alpha val="10000"/>
+                    </a:schemeClr>
+                  </a:solidFill>
+                </a:ln>
+                <a:solidFill>
+                  <a:schemeClr val="tx2"/>
+                </a:solidFill>
+                <a:latin typeface="+mj-lt"/>
+                <a:ea typeface="+mj-ea"/>
+              </a:rPr>
+              <a:t>There were issues when trying to account for inflation that we would have wanted more time to try to incorporate into our data.</a:t>
+            </a:r>
+          </a:p>
+          <a:p>
+            <a:endParaRPr lang="en-US" sz="2000" dirty="0">
+              <a:ln>
+                <a:solidFill>
+                  <a:schemeClr val="bg1">
+                    <a:lumMod val="75000"/>
+                    <a:lumOff val="25000"/>
+                    <a:alpha val="10000"/>
+                  </a:schemeClr>
+                </a:solidFill>
+              </a:ln>
+              <a:solidFill>
+                <a:schemeClr val="tx2"/>
+              </a:solidFill>
+              <a:latin typeface="+mj-lt"/>
+              <a:ea typeface="+mj-ea"/>
+            </a:endParaRPr>
+          </a:p>
+          <a:p>
+            <a:r>
+              <a:rPr lang="en-US" sz="2000" dirty="0">
+                <a:ln>
+                  <a:solidFill>
+                    <a:schemeClr val="bg1">
+                      <a:lumMod val="75000"/>
+                      <a:lumOff val="25000"/>
+                      <a:alpha val="10000"/>
+                    </a:schemeClr>
+                  </a:solidFill>
+                </a:ln>
+                <a:solidFill>
+                  <a:schemeClr val="tx2"/>
+                </a:solidFill>
+                <a:latin typeface="+mj-lt"/>
+                <a:ea typeface="+mj-ea"/>
+              </a:rPr>
+              <a:t>Another factor to possibly look at if given more time is to find out how the budget of the movie effects how much the movie makes at the box office.</a:t>
+            </a:r>
+          </a:p>
+        </p:txBody>
+      </p:sp>
+    </p:spTree>
+    <p:extLst>
+      <p:ext uri="{BB962C8B-B14F-4D97-AF65-F5344CB8AC3E}">
+        <p14:creationId xmlns:p14="http://schemas.microsoft.com/office/powerpoint/2010/main" val="2591464165"/>
+      </p:ext>
+    </p:extLst>
+  </p:cSld>
+  <p:clrMapOvr>
+    <a:masterClrMapping/>
+  </p:clrMapOvr>
 </p:sld>
 </file>
 
@@ -9017,7 +11336,77 @@
           <a:p>
             <a:r>
               <a:rPr lang="en-US" dirty="0"/>
-              <a:t>Data Analysis</a:t>
+              <a:t>User vs Critic Rating</a:t>
+            </a:r>
+          </a:p>
+        </p:txBody>
+      </p:sp>
+      <p:pic>
+        <p:nvPicPr>
+          <p:cNvPr id="3" name="Picture 2" descr="A screenshot of a cell phone&#10;&#10;Description automatically generated">
+            <a:extLst>
+              <a:ext uri="{FF2B5EF4-FFF2-40B4-BE49-F238E27FC236}">
+                <a16:creationId xmlns:a16="http://schemas.microsoft.com/office/drawing/2014/main" id="{5908121D-70E8-4AF6-B557-1C4C1894FDA5}"/>
+              </a:ext>
+            </a:extLst>
+          </p:cNvPr>
+          <p:cNvPicPr>
+            <a:picLocks noChangeAspect="1"/>
+          </p:cNvPicPr>
+          <p:nvPr/>
+        </p:nvPicPr>
+        <p:blipFill>
+          <a:blip r:embed="rId2">
+            <a:extLst>
+              <a:ext uri="{28A0092B-C50C-407E-A947-70E740481C1C}">
+                <a14:useLocalDpi xmlns:a14="http://schemas.microsoft.com/office/drawing/2010/main" val="0"/>
+              </a:ext>
+            </a:extLst>
+          </a:blip>
+          <a:stretch>
+            <a:fillRect/>
+          </a:stretch>
+        </p:blipFill>
+        <p:spPr>
+          <a:xfrm>
+            <a:off x="3257077" y="1885076"/>
+            <a:ext cx="5487650" cy="3658433"/>
+          </a:xfrm>
+          <a:prstGeom prst="rect">
+            <a:avLst/>
+          </a:prstGeom>
+        </p:spPr>
+      </p:pic>
+      <p:sp>
+        <p:nvSpPr>
+          <p:cNvPr id="8" name="Rectangle 7">
+            <a:extLst>
+              <a:ext uri="{FF2B5EF4-FFF2-40B4-BE49-F238E27FC236}">
+                <a16:creationId xmlns:a16="http://schemas.microsoft.com/office/drawing/2014/main" id="{227DDBC3-22CA-4CB9-8F3F-95CD07F78AD5}"/>
+              </a:ext>
+            </a:extLst>
+          </p:cNvPr>
+          <p:cNvSpPr/>
+          <p:nvPr/>
+        </p:nvSpPr>
+        <p:spPr>
+          <a:xfrm>
+            <a:off x="3744809" y="5879068"/>
+            <a:ext cx="4691734" cy="369332"/>
+          </a:xfrm>
+          <a:prstGeom prst="rect">
+            <a:avLst/>
+          </a:prstGeom>
+        </p:spPr>
+        <p:txBody>
+          <a:bodyPr wrap="none">
+            <a:spAutoFit/>
+          </a:bodyPr>
+          <a:lstStyle/>
+          <a:p>
+            <a:r>
+              <a:rPr lang="en-US" dirty="0"/>
+              <a:t>Two Sample P value = 3.64643515520769e-62</a:t>
             </a:r>
           </a:p>
         </p:txBody>
@@ -9025,7 +11414,7 @@
     </p:spTree>
     <p:extLst>
       <p:ext uri="{BB962C8B-B14F-4D97-AF65-F5344CB8AC3E}">
-        <p14:creationId xmlns:p14="http://schemas.microsoft.com/office/powerpoint/2010/main" val="3961791241"/>
+        <p14:creationId xmlns:p14="http://schemas.microsoft.com/office/powerpoint/2010/main" val="4026111911"/>
       </p:ext>
     </p:extLst>
   </p:cSld>
@@ -9054,10 +11443,10 @@
       </p:grpSpPr>
       <p:sp>
         <p:nvSpPr>
-          <p:cNvPr id="2" name="Title 1">
+          <p:cNvPr id="5" name="Title 4">
             <a:extLst>
               <a:ext uri="{FF2B5EF4-FFF2-40B4-BE49-F238E27FC236}">
-                <a16:creationId xmlns:a16="http://schemas.microsoft.com/office/drawing/2014/main" id="{BD4B3D39-2E2E-4FEC-ADE3-925AB11B990C}"/>
+                <a16:creationId xmlns:a16="http://schemas.microsoft.com/office/drawing/2014/main" id="{0A84CF99-998B-4D36-AE0A-6C66C12F3934}"/>
               </a:ext>
             </a:extLst>
           </p:cNvPr>
@@ -9075,362 +11464,51 @@
           <a:p>
             <a:r>
               <a:rPr lang="en-US" dirty="0"/>
-              <a:t>Interesting Findings</a:t>
-            </a:r>
-          </a:p>
-        </p:txBody>
-      </p:sp>
-      <p:sp>
-        <p:nvSpPr>
-          <p:cNvPr id="3" name="TextBox 2">
+              <a:t>User vs Critic Rating</a:t>
+            </a:r>
+          </a:p>
+        </p:txBody>
+      </p:sp>
+      <p:pic>
+        <p:nvPicPr>
+          <p:cNvPr id="3" name="Picture 2" descr="A screenshot of a social media post&#10;&#10;Description automatically generated">
             <a:extLst>
               <a:ext uri="{FF2B5EF4-FFF2-40B4-BE49-F238E27FC236}">
-                <a16:creationId xmlns:a16="http://schemas.microsoft.com/office/drawing/2014/main" id="{2E1CDD25-C2AE-4E87-BFCB-D724370ECCBF}"/>
+                <a16:creationId xmlns:a16="http://schemas.microsoft.com/office/drawing/2014/main" id="{6B8FB55C-A759-4CF7-8B5D-30FD8E96BD25}"/>
               </a:ext>
             </a:extLst>
           </p:cNvPr>
-          <p:cNvSpPr txBox="1"/>
+          <p:cNvPicPr>
+            <a:picLocks noChangeAspect="1"/>
+          </p:cNvPicPr>
           <p:nvPr/>
-        </p:nvSpPr>
+        </p:nvPicPr>
+        <p:blipFill>
+          <a:blip r:embed="rId2">
+            <a:extLst>
+              <a:ext uri="{28A0092B-C50C-407E-A947-70E740481C1C}">
+                <a14:useLocalDpi xmlns:a14="http://schemas.microsoft.com/office/drawing/2010/main" val="0"/>
+              </a:ext>
+            </a:extLst>
+          </a:blip>
+          <a:stretch>
+            <a:fillRect/>
+          </a:stretch>
+        </p:blipFill>
         <p:spPr>
           <a:xfrm>
-            <a:off x="733427" y="1628776"/>
-            <a:ext cx="10948986" cy="4832092"/>
+            <a:off x="0" y="1905000"/>
+            <a:ext cx="12192000" cy="3048000"/>
           </a:xfrm>
           <a:prstGeom prst="rect">
             <a:avLst/>
           </a:prstGeom>
-          <a:noFill/>
         </p:spPr>
-        <p:txBody>
-          <a:bodyPr wrap="square" rtlCol="0">
-            <a:spAutoFit/>
-          </a:bodyPr>
-          <a:lstStyle/>
-          <a:p>
-            <a:r>
-              <a:rPr lang="en-US" sz="1600" dirty="0">
-                <a:ln>
-                  <a:solidFill>
-                    <a:schemeClr val="bg1">
-                      <a:lumMod val="75000"/>
-                      <a:lumOff val="25000"/>
-                      <a:alpha val="10000"/>
-                    </a:schemeClr>
-                  </a:solidFill>
-                </a:ln>
-                <a:solidFill>
-                  <a:schemeClr val="tx2"/>
-                </a:solidFill>
-                <a:effectLst>
-                  <a:outerShdw blurRad="9525" dist="25400" dir="14640000" algn="tl" rotWithShape="0">
-                    <a:schemeClr val="bg1">
-                      <a:alpha val="30000"/>
-                    </a:schemeClr>
-                  </a:outerShdw>
-                </a:effectLst>
-                <a:latin typeface="+mj-lt"/>
-                <a:ea typeface="+mj-ea"/>
-              </a:rPr>
-              <a:t>Based on our intuition and the wider distribution, we expected that critic’s ratings would have been the better determinate of box office results but it was actually the user ratings</a:t>
-            </a:r>
-          </a:p>
-          <a:p>
-            <a:endParaRPr lang="en-US" sz="1600" dirty="0">
-              <a:ln>
-                <a:solidFill>
-                  <a:schemeClr val="bg1">
-                    <a:lumMod val="75000"/>
-                    <a:lumOff val="25000"/>
-                    <a:alpha val="10000"/>
-                  </a:schemeClr>
-                </a:solidFill>
-              </a:ln>
-              <a:solidFill>
-                <a:schemeClr val="tx2"/>
-              </a:solidFill>
-              <a:effectLst>
-                <a:outerShdw blurRad="9525" dist="25400" dir="14640000" algn="tl" rotWithShape="0">
-                  <a:schemeClr val="bg1">
-                    <a:alpha val="30000"/>
-                  </a:schemeClr>
-                </a:outerShdw>
-              </a:effectLst>
-              <a:latin typeface="+mj-lt"/>
-              <a:ea typeface="+mj-ea"/>
-            </a:endParaRPr>
-          </a:p>
-          <a:p>
-            <a:r>
-              <a:rPr lang="en-US" sz="1600" dirty="0">
-                <a:ln>
-                  <a:solidFill>
-                    <a:schemeClr val="bg1">
-                      <a:lumMod val="75000"/>
-                      <a:lumOff val="25000"/>
-                      <a:alpha val="10000"/>
-                    </a:schemeClr>
-                  </a:solidFill>
-                </a:ln>
-                <a:solidFill>
-                  <a:schemeClr val="tx2"/>
-                </a:solidFill>
-                <a:effectLst>
-                  <a:outerShdw blurRad="9525" dist="25400" dir="14640000" algn="tl" rotWithShape="0">
-                    <a:schemeClr val="bg1">
-                      <a:alpha val="30000"/>
-                    </a:schemeClr>
-                  </a:outerShdw>
-                </a:effectLst>
-                <a:latin typeface="+mj-lt"/>
-                <a:ea typeface="+mj-ea"/>
-              </a:rPr>
-              <a:t>When looking at the top genres with box office success, most of the genres had a gradual increase in average revenue over the years. However, the genre with the most box office revenue had inconsistencies, with some years being drastically better than other years.</a:t>
-            </a:r>
-          </a:p>
-          <a:p>
-            <a:endParaRPr lang="en-US" sz="1600" dirty="0">
-              <a:ln>
-                <a:solidFill>
-                  <a:schemeClr val="bg1">
-                    <a:lumMod val="75000"/>
-                    <a:lumOff val="25000"/>
-                    <a:alpha val="10000"/>
-                  </a:schemeClr>
-                </a:solidFill>
-              </a:ln>
-              <a:solidFill>
-                <a:schemeClr val="tx2"/>
-              </a:solidFill>
-              <a:effectLst>
-                <a:outerShdw blurRad="9525" dist="25400" dir="14640000" algn="tl" rotWithShape="0">
-                  <a:schemeClr val="bg1">
-                    <a:alpha val="30000"/>
-                  </a:schemeClr>
-                </a:outerShdw>
-              </a:effectLst>
-              <a:latin typeface="+mj-lt"/>
-              <a:ea typeface="+mj-ea"/>
-            </a:endParaRPr>
-          </a:p>
-          <a:p>
-            <a:r>
-              <a:rPr lang="en-US" sz="1600" dirty="0">
-                <a:ln>
-                  <a:solidFill>
-                    <a:schemeClr val="bg1">
-                      <a:lumMod val="75000"/>
-                      <a:lumOff val="25000"/>
-                      <a:alpha val="10000"/>
-                    </a:schemeClr>
-                  </a:solidFill>
-                </a:ln>
-                <a:solidFill>
-                  <a:schemeClr val="tx2"/>
-                </a:solidFill>
-                <a:effectLst>
-                  <a:outerShdw blurRad="9525" dist="25400" dir="14640000" algn="tl" rotWithShape="0">
-                    <a:schemeClr val="bg1">
-                      <a:alpha val="30000"/>
-                    </a:schemeClr>
-                  </a:outerShdw>
-                </a:effectLst>
-                <a:latin typeface="+mj-lt"/>
-                <a:ea typeface="+mj-ea"/>
-              </a:rPr>
-              <a:t>We also expected PG-13 movies to be the most profitable on average because of the number of releases. However, due to the number of flops PG-13 movies produce, it makes sense that G movies show the biggest average earnings.</a:t>
-            </a:r>
-          </a:p>
-          <a:p>
-            <a:endParaRPr lang="en-US" sz="1600" dirty="0">
-              <a:ln>
-                <a:solidFill>
-                  <a:schemeClr val="bg1">
-                    <a:lumMod val="75000"/>
-                    <a:lumOff val="25000"/>
-                    <a:alpha val="10000"/>
-                  </a:schemeClr>
-                </a:solidFill>
-              </a:ln>
-              <a:solidFill>
-                <a:schemeClr val="tx2"/>
-              </a:solidFill>
-              <a:effectLst>
-                <a:outerShdw blurRad="9525" dist="25400" dir="14640000" algn="tl" rotWithShape="0">
-                  <a:schemeClr val="bg1">
-                    <a:alpha val="30000"/>
-                  </a:schemeClr>
-                </a:outerShdw>
-              </a:effectLst>
-              <a:latin typeface="+mj-lt"/>
-              <a:ea typeface="+mj-ea"/>
-            </a:endParaRPr>
-          </a:p>
-          <a:p>
-            <a:r>
-              <a:rPr lang="en-US" sz="1600" dirty="0">
-                <a:ln>
-                  <a:solidFill>
-                    <a:schemeClr val="bg1">
-                      <a:lumMod val="75000"/>
-                      <a:lumOff val="25000"/>
-                      <a:alpha val="10000"/>
-                    </a:schemeClr>
-                  </a:solidFill>
-                </a:ln>
-                <a:solidFill>
-                  <a:schemeClr val="tx2"/>
-                </a:solidFill>
-                <a:effectLst>
-                  <a:outerShdw blurRad="9525" dist="25400" dir="14640000" algn="tl" rotWithShape="0">
-                    <a:schemeClr val="bg1">
-                      <a:alpha val="30000"/>
-                    </a:schemeClr>
-                  </a:outerShdw>
-                </a:effectLst>
-                <a:latin typeface="+mj-lt"/>
-                <a:ea typeface="+mj-ea"/>
-              </a:rPr>
-              <a:t>While looking at monthly distribution of earnings, it was interesting to see earnings by quarter are roughly equal. By season or individual month, it is clear as to see which times of the year are most profitable.</a:t>
-            </a:r>
-          </a:p>
-          <a:p>
-            <a:endParaRPr lang="en-US" sz="1600" dirty="0">
-              <a:ln>
-                <a:solidFill>
-                  <a:schemeClr val="bg1">
-                    <a:lumMod val="75000"/>
-                    <a:lumOff val="25000"/>
-                    <a:alpha val="10000"/>
-                  </a:schemeClr>
-                </a:solidFill>
-              </a:ln>
-              <a:solidFill>
-                <a:schemeClr val="tx2"/>
-              </a:solidFill>
-              <a:effectLst>
-                <a:outerShdw blurRad="9525" dist="25400" dir="14640000" algn="tl" rotWithShape="0">
-                  <a:schemeClr val="bg1">
-                    <a:alpha val="30000"/>
-                  </a:schemeClr>
-                </a:outerShdw>
-              </a:effectLst>
-              <a:latin typeface="+mj-lt"/>
-              <a:ea typeface="+mj-ea"/>
-            </a:endParaRPr>
-          </a:p>
-          <a:p>
-            <a:r>
-              <a:rPr lang="en-US" sz="1600" dirty="0">
-                <a:ln>
-                  <a:solidFill>
-                    <a:schemeClr val="bg1">
-                      <a:lumMod val="75000"/>
-                      <a:lumOff val="25000"/>
-                      <a:alpha val="10000"/>
-                    </a:schemeClr>
-                  </a:solidFill>
-                </a:ln>
-                <a:solidFill>
-                  <a:schemeClr val="tx2"/>
-                </a:solidFill>
-                <a:effectLst>
-                  <a:outerShdw blurRad="9525" dist="25400" dir="14640000" algn="tl" rotWithShape="0">
-                    <a:schemeClr val="bg1">
-                      <a:alpha val="30000"/>
-                    </a:schemeClr>
-                  </a:outerShdw>
-                </a:effectLst>
-                <a:latin typeface="+mj-lt"/>
-                <a:ea typeface="+mj-ea"/>
-              </a:rPr>
-              <a:t>Was not expecting to find a relationship with runtime and box office results. The thought was if a movie was good, it did not matter how long the movie was.</a:t>
-            </a:r>
-          </a:p>
-          <a:p>
-            <a:endParaRPr lang="en-US" sz="1600" dirty="0">
-              <a:ln>
-                <a:solidFill>
-                  <a:schemeClr val="bg1">
-                    <a:lumMod val="75000"/>
-                    <a:lumOff val="25000"/>
-                    <a:alpha val="10000"/>
-                  </a:schemeClr>
-                </a:solidFill>
-              </a:ln>
-              <a:solidFill>
-                <a:schemeClr val="tx2"/>
-              </a:solidFill>
-              <a:effectLst>
-                <a:outerShdw blurRad="9525" dist="25400" dir="14640000" algn="tl" rotWithShape="0">
-                  <a:schemeClr val="bg1">
-                    <a:alpha val="30000"/>
-                  </a:schemeClr>
-                </a:outerShdw>
-              </a:effectLst>
-              <a:latin typeface="+mj-lt"/>
-              <a:ea typeface="+mj-ea"/>
-            </a:endParaRPr>
-          </a:p>
-          <a:p>
-            <a:r>
-              <a:rPr lang="en-US" sz="1600" dirty="0">
-                <a:ln>
-                  <a:solidFill>
-                    <a:schemeClr val="bg1">
-                      <a:lumMod val="75000"/>
-                      <a:lumOff val="25000"/>
-                      <a:alpha val="10000"/>
-                    </a:schemeClr>
-                  </a:solidFill>
-                </a:ln>
-                <a:solidFill>
-                  <a:schemeClr val="tx2"/>
-                </a:solidFill>
-                <a:effectLst>
-                  <a:outerShdw blurRad="9525" dist="25400" dir="14640000" algn="tl" rotWithShape="0">
-                    <a:schemeClr val="bg1">
-                      <a:alpha val="30000"/>
-                    </a:schemeClr>
-                  </a:outerShdw>
-                </a:effectLst>
-                <a:latin typeface="+mj-lt"/>
-                <a:ea typeface="+mj-ea"/>
-              </a:rPr>
-              <a:t>Given the data, an accurate assumption that can be made is that the majority of movies did not perform well and made less than $100 million at the box office.</a:t>
-            </a:r>
-          </a:p>
-          <a:p>
-            <a:endParaRPr lang="en-US" sz="2000" dirty="0">
-              <a:ln>
-                <a:solidFill>
-                  <a:schemeClr val="bg1">
-                    <a:lumMod val="75000"/>
-                    <a:lumOff val="25000"/>
-                    <a:alpha val="10000"/>
-                  </a:schemeClr>
-                </a:solidFill>
-              </a:ln>
-              <a:solidFill>
-                <a:schemeClr val="tx2"/>
-              </a:solidFill>
-              <a:effectLst>
-                <a:outerShdw blurRad="9525" dist="25400" dir="14640000" algn="tl" rotWithShape="0">
-                  <a:schemeClr val="bg1">
-                    <a:alpha val="30000"/>
-                  </a:schemeClr>
-                </a:outerShdw>
-              </a:effectLst>
-              <a:latin typeface="+mj-lt"/>
-              <a:ea typeface="+mj-ea"/>
-            </a:endParaRPr>
-          </a:p>
-        </p:txBody>
-      </p:sp>
+      </p:pic>
     </p:spTree>
     <p:extLst>
       <p:ext uri="{BB962C8B-B14F-4D97-AF65-F5344CB8AC3E}">
-        <p14:creationId xmlns:p14="http://schemas.microsoft.com/office/powerpoint/2010/main" val="3466785875"/>
+        <p14:creationId xmlns:p14="http://schemas.microsoft.com/office/powerpoint/2010/main" val="3984633679"/>
       </p:ext>
     </p:extLst>
   </p:cSld>
@@ -9459,10 +11537,10 @@
       </p:grpSpPr>
       <p:sp>
         <p:nvSpPr>
-          <p:cNvPr id="3" name="Title 2">
+          <p:cNvPr id="5" name="Title 4">
             <a:extLst>
               <a:ext uri="{FF2B5EF4-FFF2-40B4-BE49-F238E27FC236}">
-                <a16:creationId xmlns:a16="http://schemas.microsoft.com/office/drawing/2014/main" id="{80704585-8A7A-400E-89F5-7A18806249B5}"/>
+                <a16:creationId xmlns:a16="http://schemas.microsoft.com/office/drawing/2014/main" id="{0A84CF99-998B-4D36-AE0A-6C66C12F3934}"/>
               </a:ext>
             </a:extLst>
           </p:cNvPr>
@@ -9479,186 +11557,46 @@
           <a:lstStyle/>
           <a:p>
             <a:r>
-              <a:rPr lang="en-US" dirty="0">
-                <a:effectLst/>
-              </a:rPr>
-              <a:t>Post Mortem</a:t>
-            </a:r>
-            <a:endParaRPr lang="en-US" dirty="0"/>
-          </a:p>
-        </p:txBody>
-      </p:sp>
-      <p:sp>
-        <p:nvSpPr>
-          <p:cNvPr id="4" name="TextBox 3">
+              <a:rPr lang="en-US" dirty="0"/>
+              <a:t>User vs Critic Rating</a:t>
+            </a:r>
+          </a:p>
+        </p:txBody>
+      </p:sp>
+      <p:pic>
+        <p:nvPicPr>
+          <p:cNvPr id="2" name="Picture 1">
             <a:extLst>
               <a:ext uri="{FF2B5EF4-FFF2-40B4-BE49-F238E27FC236}">
-                <a16:creationId xmlns:a16="http://schemas.microsoft.com/office/drawing/2014/main" id="{C7F18598-C141-4BF6-83B0-3D66F0ED9164}"/>
+                <a16:creationId xmlns:a16="http://schemas.microsoft.com/office/drawing/2014/main" id="{33981C83-336C-4112-881A-B041B0ED8556}"/>
               </a:ext>
             </a:extLst>
           </p:cNvPr>
-          <p:cNvSpPr txBox="1"/>
+          <p:cNvPicPr>
+            <a:picLocks noChangeAspect="1"/>
+          </p:cNvPicPr>
           <p:nvPr/>
-        </p:nvSpPr>
+        </p:nvPicPr>
+        <p:blipFill>
+          <a:blip r:embed="rId2"/>
+          <a:stretch>
+            <a:fillRect/>
+          </a:stretch>
+        </p:blipFill>
         <p:spPr>
           <a:xfrm>
-            <a:off x="607162" y="1580050"/>
-            <a:ext cx="10460736" cy="3477875"/>
+            <a:off x="120343" y="1657259"/>
+            <a:ext cx="11951314" cy="3543482"/>
           </a:xfrm>
           <a:prstGeom prst="rect">
             <a:avLst/>
           </a:prstGeom>
-          <a:noFill/>
         </p:spPr>
-        <p:txBody>
-          <a:bodyPr wrap="square" rtlCol="0">
-            <a:spAutoFit/>
-          </a:bodyPr>
-          <a:lstStyle/>
-          <a:p>
-            <a:r>
-              <a:rPr lang="en-US" sz="2000" dirty="0">
-                <a:ln>
-                  <a:solidFill>
-                    <a:schemeClr val="bg1">
-                      <a:lumMod val="75000"/>
-                      <a:lumOff val="25000"/>
-                      <a:alpha val="10000"/>
-                    </a:schemeClr>
-                  </a:solidFill>
-                </a:ln>
-                <a:solidFill>
-                  <a:schemeClr val="tx2"/>
-                </a:solidFill>
-                <a:latin typeface="+mj-lt"/>
-                <a:ea typeface="+mj-ea"/>
-              </a:rPr>
-              <a:t>We would have liked to perform a statistical analysis incorporating all the variables to see how they interact, but due deficiencies in time and expertise, we could not</a:t>
-            </a:r>
-          </a:p>
-          <a:p>
-            <a:endParaRPr lang="en-US" sz="2000" dirty="0">
-              <a:ln>
-                <a:solidFill>
-                  <a:schemeClr val="bg1">
-                    <a:lumMod val="75000"/>
-                    <a:lumOff val="25000"/>
-                    <a:alpha val="10000"/>
-                  </a:schemeClr>
-                </a:solidFill>
-              </a:ln>
-              <a:solidFill>
-                <a:schemeClr val="tx2"/>
-              </a:solidFill>
-              <a:latin typeface="+mj-lt"/>
-              <a:ea typeface="+mj-ea"/>
-            </a:endParaRPr>
-          </a:p>
-          <a:p>
-            <a:r>
-              <a:rPr lang="en-US" sz="2000" dirty="0">
-                <a:ln>
-                  <a:solidFill>
-                    <a:schemeClr val="bg1">
-                      <a:lumMod val="75000"/>
-                      <a:lumOff val="25000"/>
-                      <a:alpha val="10000"/>
-                    </a:schemeClr>
-                  </a:solidFill>
-                </a:ln>
-                <a:solidFill>
-                  <a:schemeClr val="tx2"/>
-                </a:solidFill>
-                <a:latin typeface="+mj-lt"/>
-                <a:ea typeface="+mj-ea"/>
-              </a:rPr>
-              <a:t>If there was more time to work, it would be interesting to compile a bigger list of movies to see if these trends are similar to trends in the past or if they have evolved over time.</a:t>
-            </a:r>
-          </a:p>
-          <a:p>
-            <a:endParaRPr lang="en-US" sz="2000" dirty="0">
-              <a:ln>
-                <a:solidFill>
-                  <a:schemeClr val="bg1">
-                    <a:lumMod val="75000"/>
-                    <a:lumOff val="25000"/>
-                    <a:alpha val="10000"/>
-                  </a:schemeClr>
-                </a:solidFill>
-              </a:ln>
-              <a:solidFill>
-                <a:schemeClr val="tx2"/>
-              </a:solidFill>
-              <a:latin typeface="+mj-lt"/>
-              <a:ea typeface="+mj-ea"/>
-            </a:endParaRPr>
-          </a:p>
-          <a:p>
-            <a:r>
-              <a:rPr lang="en-US" sz="2000" dirty="0">
-                <a:ln>
-                  <a:solidFill>
-                    <a:schemeClr val="bg1">
-                      <a:lumMod val="75000"/>
-                      <a:lumOff val="25000"/>
-                      <a:alpha val="10000"/>
-                    </a:schemeClr>
-                  </a:solidFill>
-                </a:ln>
-                <a:solidFill>
-                  <a:schemeClr val="tx2"/>
-                </a:solidFill>
-                <a:latin typeface="+mj-lt"/>
-                <a:ea typeface="+mj-ea"/>
-              </a:rPr>
-              <a:t>There were issues when trying to account for inflation that we would have wanted more time to try to incorporate into our data.</a:t>
-            </a:r>
-          </a:p>
-          <a:p>
-            <a:endParaRPr lang="en-US" sz="2000" dirty="0">
-              <a:ln>
-                <a:solidFill>
-                  <a:schemeClr val="bg1">
-                    <a:lumMod val="75000"/>
-                    <a:lumOff val="25000"/>
-                    <a:alpha val="10000"/>
-                  </a:schemeClr>
-                </a:solidFill>
-              </a:ln>
-              <a:solidFill>
-                <a:schemeClr val="tx2"/>
-              </a:solidFill>
-              <a:latin typeface="+mj-lt"/>
-              <a:ea typeface="+mj-ea"/>
-            </a:endParaRPr>
-          </a:p>
-          <a:p>
-            <a:r>
-              <a:rPr lang="en-US" sz="2000" dirty="0">
-                <a:ln>
-                  <a:solidFill>
-                    <a:schemeClr val="bg1">
-                      <a:lumMod val="75000"/>
-                      <a:lumOff val="25000"/>
-                      <a:alpha val="10000"/>
-                    </a:schemeClr>
-                  </a:solidFill>
-                </a:ln>
-                <a:solidFill>
-                  <a:schemeClr val="tx2"/>
-                </a:solidFill>
-                <a:latin typeface="+mj-lt"/>
-                <a:ea typeface="+mj-ea"/>
-              </a:rPr>
-              <a:t>Another factor to possibly look at if given more time is to find out how the budget of the movie effects how much the movie makes at the box office.</a:t>
-            </a:r>
-          </a:p>
-        </p:txBody>
-      </p:sp>
+      </p:pic>
     </p:spTree>
     <p:extLst>
       <p:ext uri="{BB962C8B-B14F-4D97-AF65-F5344CB8AC3E}">
-        <p14:creationId xmlns:p14="http://schemas.microsoft.com/office/powerpoint/2010/main" val="2591464165"/>
+        <p14:creationId xmlns:p14="http://schemas.microsoft.com/office/powerpoint/2010/main" val="2103557615"/>
       </p:ext>
     </p:extLst>
   </p:cSld>

</xml_diff>